<commit_message>
Upload deep learning model
</commit_message>
<xml_diff>
--- a/Project 4.pptx
+++ b/Project 4.pptx
@@ -5,7 +5,7 @@
     <p:sldMasterId id="2147483660" r:id="rId4"/>
   </p:sldMasterIdLst>
   <p:notesMasterIdLst>
-    <p:notesMasterId r:id="rId16"/>
+    <p:notesMasterId r:id="rId21"/>
   </p:notesMasterIdLst>
   <p:sldIdLst>
     <p:sldId id="259" r:id="rId5"/>
@@ -19,6 +19,11 @@
     <p:sldId id="315" r:id="rId13"/>
     <p:sldId id="296" r:id="rId14"/>
     <p:sldId id="316" r:id="rId15"/>
+    <p:sldId id="321" r:id="rId16"/>
+    <p:sldId id="325" r:id="rId17"/>
+    <p:sldId id="320" r:id="rId18"/>
+    <p:sldId id="323" r:id="rId19"/>
+    <p:sldId id="322" r:id="rId20"/>
   </p:sldIdLst>
   <p:sldSz cx="12192000" cy="6858000"/>
   <p:notesSz cx="6858000" cy="9144000"/>
@@ -11279,6 +11284,2421 @@
     <p:extLst>
       <p:ext uri="{BB962C8B-B14F-4D97-AF65-F5344CB8AC3E}">
         <p14:creationId xmlns:p14="http://schemas.microsoft.com/office/powerpoint/2010/main" val="116697314"/>
+      </p:ext>
+    </p:extLst>
+  </p:cSld>
+  <p:clrMapOvr>
+    <a:masterClrMapping/>
+  </p:clrMapOvr>
+</p:sld>
+</file>
+
+<file path=ppt/slides/slide12.xml><?xml version="1.0" encoding="utf-8"?>
+<p:sld xmlns:a="http://schemas.openxmlformats.org/drawingml/2006/main" xmlns:r="http://schemas.openxmlformats.org/officeDocument/2006/relationships" xmlns:p="http://schemas.openxmlformats.org/presentationml/2006/main">
+  <p:cSld>
+    <p:spTree>
+      <p:nvGrpSpPr>
+        <p:cNvPr id="1" name=""/>
+        <p:cNvGrpSpPr/>
+        <p:nvPr/>
+      </p:nvGrpSpPr>
+      <p:grpSpPr>
+        <a:xfrm>
+          <a:off x="0" y="0"/>
+          <a:ext cx="0" cy="0"/>
+          <a:chOff x="0" y="0"/>
+          <a:chExt cx="0" cy="0"/>
+        </a:xfrm>
+      </p:grpSpPr>
+      <p:sp>
+        <p:nvSpPr>
+          <p:cNvPr id="2" name="Title 1">
+            <a:extLst>
+              <a:ext uri="{FF2B5EF4-FFF2-40B4-BE49-F238E27FC236}">
+                <a16:creationId xmlns:a16="http://schemas.microsoft.com/office/drawing/2014/main" id="{7E9D8101-4ED5-4D91-9EFA-B0E7C1EA6E26}"/>
+              </a:ext>
+            </a:extLst>
+          </p:cNvPr>
+          <p:cNvSpPr>
+            <a:spLocks noGrp="1"/>
+          </p:cNvSpPr>
+          <p:nvPr>
+            <p:ph type="title"/>
+          </p:nvPr>
+        </p:nvSpPr>
+        <p:spPr>
+          <a:xfrm>
+            <a:off x="969264" y="2679192"/>
+            <a:ext cx="4946904" cy="3273552"/>
+          </a:xfrm>
+        </p:spPr>
+        <p:txBody>
+          <a:bodyPr/>
+          <a:lstStyle/>
+          <a:p>
+            <a:r>
+              <a:rPr lang="en-US" dirty="0"/>
+              <a:t>Topic THREE</a:t>
+            </a:r>
+          </a:p>
+        </p:txBody>
+      </p:sp>
+      <p:pic>
+        <p:nvPicPr>
+          <p:cNvPr id="8" name="Picture Placeholder 7" descr="View of city buildings over the water from a track">
+            <a:extLst>
+              <a:ext uri="{FF2B5EF4-FFF2-40B4-BE49-F238E27FC236}">
+                <a16:creationId xmlns:a16="http://schemas.microsoft.com/office/drawing/2014/main" id="{5A5996C8-9A00-4071-B24A-D1B22DDFAD6F}"/>
+              </a:ext>
+            </a:extLst>
+          </p:cNvPr>
+          <p:cNvPicPr>
+            <a:picLocks noGrp="1" noChangeAspect="1"/>
+          </p:cNvPicPr>
+          <p:nvPr>
+            <p:ph type="pic" sz="quarter" idx="13"/>
+          </p:nvPr>
+        </p:nvPicPr>
+        <p:blipFill rotWithShape="1">
+          <a:blip r:embed="rId2" cstate="screen">
+            <a:extLst>
+              <a:ext uri="{28A0092B-C50C-407E-A947-70E740481C1C}">
+                <a14:useLocalDpi xmlns:a14="http://schemas.microsoft.com/office/drawing/2010/main"/>
+              </a:ext>
+            </a:extLst>
+          </a:blip>
+          <a:srcRect/>
+          <a:stretch/>
+        </p:blipFill>
+        <p:spPr>
+          <a:xfrm>
+            <a:off x="3208292" y="3"/>
+            <a:ext cx="8997356" cy="4581079"/>
+          </a:xfrm>
+        </p:spPr>
+      </p:pic>
+      <p:pic>
+        <p:nvPicPr>
+          <p:cNvPr id="10" name="Picture Placeholder 9" descr="View of city buildings over the water">
+            <a:extLst>
+              <a:ext uri="{FF2B5EF4-FFF2-40B4-BE49-F238E27FC236}">
+                <a16:creationId xmlns:a16="http://schemas.microsoft.com/office/drawing/2014/main" id="{C2C517CC-DCFE-4E86-A4E5-F5BFD7BF69FF}"/>
+              </a:ext>
+            </a:extLst>
+          </p:cNvPr>
+          <p:cNvPicPr>
+            <a:picLocks noGrp="1" noChangeAspect="1"/>
+          </p:cNvPicPr>
+          <p:nvPr>
+            <p:ph type="pic" sz="quarter" idx="14"/>
+          </p:nvPr>
+        </p:nvPicPr>
+        <p:blipFill rotWithShape="1">
+          <a:blip r:embed="rId3" cstate="screen">
+            <a:extLst>
+              <a:ext uri="{28A0092B-C50C-407E-A947-70E740481C1C}">
+                <a14:useLocalDpi xmlns:a14="http://schemas.microsoft.com/office/drawing/2010/main"/>
+              </a:ext>
+            </a:extLst>
+          </a:blip>
+          <a:srcRect/>
+          <a:stretch/>
+        </p:blipFill>
+        <p:spPr>
+          <a:xfrm>
+            <a:off x="7243070" y="883420"/>
+            <a:ext cx="4948931" cy="5974580"/>
+          </a:xfrm>
+        </p:spPr>
+      </p:pic>
+      <p:pic>
+        <p:nvPicPr>
+          <p:cNvPr id="12" name="Picture Placeholder 11" descr="A picture containing glass buildings with reflection">
+            <a:extLst>
+              <a:ext uri="{FF2B5EF4-FFF2-40B4-BE49-F238E27FC236}">
+                <a16:creationId xmlns:a16="http://schemas.microsoft.com/office/drawing/2014/main" id="{90D6ECDF-A0E4-4308-967E-8BAC3E85A4B7}"/>
+              </a:ext>
+            </a:extLst>
+          </p:cNvPr>
+          <p:cNvPicPr>
+            <a:picLocks noGrp="1" noChangeAspect="1"/>
+          </p:cNvPicPr>
+          <p:nvPr>
+            <p:ph type="pic" sz="quarter" idx="15"/>
+          </p:nvPr>
+        </p:nvPicPr>
+        <p:blipFill rotWithShape="1">
+          <a:blip r:embed="rId4" cstate="screen">
+            <a:extLst>
+              <a:ext uri="{28A0092B-C50C-407E-A947-70E740481C1C}">
+                <a14:useLocalDpi xmlns:a14="http://schemas.microsoft.com/office/drawing/2010/main"/>
+              </a:ext>
+            </a:extLst>
+          </a:blip>
+          <a:srcRect/>
+          <a:stretch/>
+        </p:blipFill>
+        <p:spPr>
+          <a:xfrm>
+            <a:off x="4234997" y="4574265"/>
+            <a:ext cx="5074516" cy="2298983"/>
+          </a:xfrm>
+        </p:spPr>
+      </p:pic>
+    </p:spTree>
+    <p:extLst>
+      <p:ext uri="{BB962C8B-B14F-4D97-AF65-F5344CB8AC3E}">
+        <p14:creationId xmlns:p14="http://schemas.microsoft.com/office/powerpoint/2010/main" val="463899147"/>
+      </p:ext>
+    </p:extLst>
+  </p:cSld>
+  <p:clrMapOvr>
+    <a:masterClrMapping/>
+  </p:clrMapOvr>
+</p:sld>
+</file>
+
+<file path=ppt/slides/slide13.xml><?xml version="1.0" encoding="utf-8"?>
+<p:sld xmlns:a="http://schemas.openxmlformats.org/drawingml/2006/main" xmlns:r="http://schemas.openxmlformats.org/officeDocument/2006/relationships" xmlns:p="http://schemas.openxmlformats.org/presentationml/2006/main">
+  <p:cSld>
+    <p:spTree>
+      <p:nvGrpSpPr>
+        <p:cNvPr id="1" name=""/>
+        <p:cNvGrpSpPr/>
+        <p:nvPr/>
+      </p:nvGrpSpPr>
+      <p:grpSpPr>
+        <a:xfrm>
+          <a:off x="0" y="0"/>
+          <a:ext cx="0" cy="0"/>
+          <a:chOff x="0" y="0"/>
+          <a:chExt cx="0" cy="0"/>
+        </a:xfrm>
+      </p:grpSpPr>
+      <p:sp>
+        <p:nvSpPr>
+          <p:cNvPr id="2" name="Title 1">
+            <a:extLst>
+              <a:ext uri="{FF2B5EF4-FFF2-40B4-BE49-F238E27FC236}">
+                <a16:creationId xmlns:a16="http://schemas.microsoft.com/office/drawing/2014/main" id="{46C8712D-6BDE-21F2-43B6-B2170C9FDA4A}"/>
+              </a:ext>
+            </a:extLst>
+          </p:cNvPr>
+          <p:cNvSpPr>
+            <a:spLocks noGrp="1"/>
+          </p:cNvSpPr>
+          <p:nvPr>
+            <p:ph type="title"/>
+          </p:nvPr>
+        </p:nvSpPr>
+        <p:spPr/>
+        <p:txBody>
+          <a:bodyPr/>
+          <a:lstStyle/>
+          <a:p>
+            <a:r>
+              <a:rPr lang="en-AU" dirty="0"/>
+              <a:t>Parameters for modelling</a:t>
+            </a:r>
+          </a:p>
+        </p:txBody>
+      </p:sp>
+      <p:sp>
+        <p:nvSpPr>
+          <p:cNvPr id="3" name="Content Placeholder 2">
+            <a:extLst>
+              <a:ext uri="{FF2B5EF4-FFF2-40B4-BE49-F238E27FC236}">
+                <a16:creationId xmlns:a16="http://schemas.microsoft.com/office/drawing/2014/main" id="{11E5E28B-0B39-F403-DD27-2BD4A466E05C}"/>
+              </a:ext>
+            </a:extLst>
+          </p:cNvPr>
+          <p:cNvSpPr>
+            <a:spLocks noGrp="1"/>
+          </p:cNvSpPr>
+          <p:nvPr>
+            <p:ph idx="1"/>
+          </p:nvPr>
+        </p:nvSpPr>
+        <p:spPr/>
+        <p:txBody>
+          <a:bodyPr>
+            <a:normAutofit fontScale="85000" lnSpcReduction="20000"/>
+          </a:bodyPr>
+          <a:lstStyle/>
+          <a:p>
+            <a:pPr marL="342900" indent="-342900">
+              <a:buFont typeface="Arial" panose="020B0604020202020204" pitchFamily="34" charset="0"/>
+              <a:buChar char="•"/>
+            </a:pPr>
+            <a:r>
+              <a:rPr lang="en-AU" dirty="0"/>
+              <a:t>Latitude</a:t>
+            </a:r>
+          </a:p>
+          <a:p>
+            <a:pPr marL="342900" indent="-342900">
+              <a:buFont typeface="Arial" panose="020B0604020202020204" pitchFamily="34" charset="0"/>
+              <a:buChar char="•"/>
+            </a:pPr>
+            <a:r>
+              <a:rPr lang="en-AU" dirty="0"/>
+              <a:t>Longitude</a:t>
+            </a:r>
+          </a:p>
+          <a:p>
+            <a:pPr marL="342900" indent="-342900">
+              <a:buFont typeface="Arial" panose="020B0604020202020204" pitchFamily="34" charset="0"/>
+              <a:buChar char="•"/>
+            </a:pPr>
+            <a:r>
+              <a:rPr lang="en-AU" dirty="0"/>
+              <a:t>No of bedrooms</a:t>
+            </a:r>
+          </a:p>
+          <a:p>
+            <a:pPr marL="342900" indent="-342900">
+              <a:buFont typeface="Arial" panose="020B0604020202020204" pitchFamily="34" charset="0"/>
+              <a:buChar char="•"/>
+            </a:pPr>
+            <a:r>
+              <a:rPr lang="en-AU" dirty="0"/>
+              <a:t>Property Type</a:t>
+            </a:r>
+          </a:p>
+          <a:p>
+            <a:pPr marL="342900" indent="-342900">
+              <a:buFont typeface="Arial" panose="020B0604020202020204" pitchFamily="34" charset="0"/>
+              <a:buChar char="•"/>
+            </a:pPr>
+            <a:r>
+              <a:rPr lang="en-AU" dirty="0"/>
+              <a:t>Postcode</a:t>
+            </a:r>
+          </a:p>
+          <a:p>
+            <a:pPr marL="342900" indent="-342900">
+              <a:buFont typeface="Arial" panose="020B0604020202020204" pitchFamily="34" charset="0"/>
+              <a:buChar char="•"/>
+            </a:pPr>
+            <a:r>
+              <a:rPr lang="en-AU" dirty="0"/>
+              <a:t>Month sold</a:t>
+            </a:r>
+          </a:p>
+          <a:p>
+            <a:pPr marL="342900" indent="-342900">
+              <a:buFont typeface="Arial" panose="020B0604020202020204" pitchFamily="34" charset="0"/>
+              <a:buChar char="•"/>
+            </a:pPr>
+            <a:r>
+              <a:rPr lang="en-AU" dirty="0"/>
+              <a:t>Year sold</a:t>
+            </a:r>
+          </a:p>
+        </p:txBody>
+      </p:sp>
+      <p:sp>
+        <p:nvSpPr>
+          <p:cNvPr id="4" name="Footer Placeholder 3">
+            <a:extLst>
+              <a:ext uri="{FF2B5EF4-FFF2-40B4-BE49-F238E27FC236}">
+                <a16:creationId xmlns:a16="http://schemas.microsoft.com/office/drawing/2014/main" id="{CAE3AC15-911B-5138-2958-479FA2734113}"/>
+              </a:ext>
+            </a:extLst>
+          </p:cNvPr>
+          <p:cNvSpPr>
+            <a:spLocks noGrp="1"/>
+          </p:cNvSpPr>
+          <p:nvPr>
+            <p:ph type="ftr" sz="quarter" idx="11"/>
+          </p:nvPr>
+        </p:nvSpPr>
+        <p:spPr/>
+        <p:txBody>
+          <a:bodyPr/>
+          <a:lstStyle/>
+          <a:p>
+            <a:r>
+              <a:rPr lang="en-US"/>
+              <a:t>Sample Footer Text</a:t>
+            </a:r>
+            <a:endParaRPr lang="en-US" dirty="0"/>
+          </a:p>
+        </p:txBody>
+      </p:sp>
+      <p:sp>
+        <p:nvSpPr>
+          <p:cNvPr id="5" name="Date Placeholder 4">
+            <a:extLst>
+              <a:ext uri="{FF2B5EF4-FFF2-40B4-BE49-F238E27FC236}">
+                <a16:creationId xmlns:a16="http://schemas.microsoft.com/office/drawing/2014/main" id="{86EFD0CA-E38D-2C66-7FB2-9281C980F2B2}"/>
+              </a:ext>
+            </a:extLst>
+          </p:cNvPr>
+          <p:cNvSpPr>
+            <a:spLocks noGrp="1"/>
+          </p:cNvSpPr>
+          <p:nvPr>
+            <p:ph type="dt" sz="half" idx="10"/>
+          </p:nvPr>
+        </p:nvSpPr>
+        <p:spPr/>
+        <p:txBody>
+          <a:bodyPr/>
+          <a:lstStyle/>
+          <a:p>
+            <a:r>
+              <a:rPr lang="en-US"/>
+              <a:t>2/7/20XX</a:t>
+            </a:r>
+            <a:endParaRPr lang="en-US" dirty="0"/>
+          </a:p>
+        </p:txBody>
+      </p:sp>
+      <p:sp>
+        <p:nvSpPr>
+          <p:cNvPr id="6" name="Slide Number Placeholder 5">
+            <a:extLst>
+              <a:ext uri="{FF2B5EF4-FFF2-40B4-BE49-F238E27FC236}">
+                <a16:creationId xmlns:a16="http://schemas.microsoft.com/office/drawing/2014/main" id="{7CF65E9C-E219-EA7C-94BA-A3AF7A597A27}"/>
+              </a:ext>
+            </a:extLst>
+          </p:cNvPr>
+          <p:cNvSpPr>
+            <a:spLocks noGrp="1"/>
+          </p:cNvSpPr>
+          <p:nvPr>
+            <p:ph type="sldNum" sz="quarter" idx="12"/>
+          </p:nvPr>
+        </p:nvSpPr>
+        <p:spPr/>
+        <p:txBody>
+          <a:bodyPr/>
+          <a:lstStyle/>
+          <a:p>
+            <a:fld id="{312CC964-A50B-4C29-B4E4-2C30BB34CCF3}" type="slidenum">
+              <a:rPr lang="en-US" smtClean="0"/>
+              <a:t>13</a:t>
+            </a:fld>
+            <a:endParaRPr lang="en-US" dirty="0"/>
+          </a:p>
+        </p:txBody>
+      </p:sp>
+    </p:spTree>
+    <p:extLst>
+      <p:ext uri="{BB962C8B-B14F-4D97-AF65-F5344CB8AC3E}">
+        <p14:creationId xmlns:p14="http://schemas.microsoft.com/office/powerpoint/2010/main" val="2117326338"/>
+      </p:ext>
+    </p:extLst>
+  </p:cSld>
+  <p:clrMapOvr>
+    <a:masterClrMapping/>
+  </p:clrMapOvr>
+</p:sld>
+</file>
+
+<file path=ppt/slides/slide14.xml><?xml version="1.0" encoding="utf-8"?>
+<p:sld xmlns:a="http://schemas.openxmlformats.org/drawingml/2006/main" xmlns:r="http://schemas.openxmlformats.org/officeDocument/2006/relationships" xmlns:p="http://schemas.openxmlformats.org/presentationml/2006/main">
+  <p:cSld>
+    <p:spTree>
+      <p:nvGrpSpPr>
+        <p:cNvPr id="1" name=""/>
+        <p:cNvGrpSpPr/>
+        <p:nvPr/>
+      </p:nvGrpSpPr>
+      <p:grpSpPr>
+        <a:xfrm>
+          <a:off x="0" y="0"/>
+          <a:ext cx="0" cy="0"/>
+          <a:chOff x="0" y="0"/>
+          <a:chExt cx="0" cy="0"/>
+        </a:xfrm>
+      </p:grpSpPr>
+      <p:sp>
+        <p:nvSpPr>
+          <p:cNvPr id="2" name="Title 1">
+            <a:extLst>
+              <a:ext uri="{FF2B5EF4-FFF2-40B4-BE49-F238E27FC236}">
+                <a16:creationId xmlns:a16="http://schemas.microsoft.com/office/drawing/2014/main" id="{2777D005-553D-A1D3-100E-EFB4E94554F0}"/>
+              </a:ext>
+            </a:extLst>
+          </p:cNvPr>
+          <p:cNvSpPr>
+            <a:spLocks noGrp="1"/>
+          </p:cNvSpPr>
+          <p:nvPr>
+            <p:ph type="title"/>
+          </p:nvPr>
+        </p:nvSpPr>
+        <p:spPr/>
+        <p:txBody>
+          <a:bodyPr>
+            <a:normAutofit/>
+          </a:bodyPr>
+          <a:lstStyle/>
+          <a:p>
+            <a:r>
+              <a:rPr lang="en-AU" dirty="0"/>
+              <a:t>Data modelling comparison</a:t>
+            </a:r>
+          </a:p>
+        </p:txBody>
+      </p:sp>
+      <p:sp>
+        <p:nvSpPr>
+          <p:cNvPr id="3" name="Content Placeholder 2">
+            <a:extLst>
+              <a:ext uri="{FF2B5EF4-FFF2-40B4-BE49-F238E27FC236}">
+                <a16:creationId xmlns:a16="http://schemas.microsoft.com/office/drawing/2014/main" id="{7A2BDD33-7B70-D5F9-9F12-BC482A302475}"/>
+              </a:ext>
+            </a:extLst>
+          </p:cNvPr>
+          <p:cNvSpPr>
+            <a:spLocks noGrp="1"/>
+          </p:cNvSpPr>
+          <p:nvPr>
+            <p:ph idx="1"/>
+          </p:nvPr>
+        </p:nvSpPr>
+        <p:spPr/>
+        <p:txBody>
+          <a:bodyPr/>
+          <a:lstStyle/>
+          <a:p>
+            <a:r>
+              <a:rPr lang="en-AU" dirty="0"/>
+              <a:t>Linear Regression vs </a:t>
+            </a:r>
+            <a:r>
+              <a:rPr lang="en-AU" dirty="0" err="1"/>
+              <a:t>Keras</a:t>
+            </a:r>
+            <a:r>
+              <a:rPr lang="en-AU" dirty="0"/>
+              <a:t> Regression</a:t>
+            </a:r>
+          </a:p>
+        </p:txBody>
+      </p:sp>
+      <p:sp>
+        <p:nvSpPr>
+          <p:cNvPr id="4" name="Footer Placeholder 3">
+            <a:extLst>
+              <a:ext uri="{FF2B5EF4-FFF2-40B4-BE49-F238E27FC236}">
+                <a16:creationId xmlns:a16="http://schemas.microsoft.com/office/drawing/2014/main" id="{34C03716-A74C-5B5C-A86D-D4E5FCBF9F6C}"/>
+              </a:ext>
+            </a:extLst>
+          </p:cNvPr>
+          <p:cNvSpPr>
+            <a:spLocks noGrp="1"/>
+          </p:cNvSpPr>
+          <p:nvPr>
+            <p:ph type="ftr" sz="quarter" idx="11"/>
+          </p:nvPr>
+        </p:nvSpPr>
+        <p:spPr/>
+        <p:txBody>
+          <a:bodyPr/>
+          <a:lstStyle/>
+          <a:p>
+            <a:r>
+              <a:rPr lang="en-US"/>
+              <a:t>Sample Footer Text</a:t>
+            </a:r>
+            <a:endParaRPr lang="en-US" dirty="0"/>
+          </a:p>
+        </p:txBody>
+      </p:sp>
+      <p:sp>
+        <p:nvSpPr>
+          <p:cNvPr id="5" name="Date Placeholder 4">
+            <a:extLst>
+              <a:ext uri="{FF2B5EF4-FFF2-40B4-BE49-F238E27FC236}">
+                <a16:creationId xmlns:a16="http://schemas.microsoft.com/office/drawing/2014/main" id="{2F703136-C87E-079B-536D-BADA018F277F}"/>
+              </a:ext>
+            </a:extLst>
+          </p:cNvPr>
+          <p:cNvSpPr>
+            <a:spLocks noGrp="1"/>
+          </p:cNvSpPr>
+          <p:nvPr>
+            <p:ph type="dt" sz="half" idx="10"/>
+          </p:nvPr>
+        </p:nvSpPr>
+        <p:spPr/>
+        <p:txBody>
+          <a:bodyPr/>
+          <a:lstStyle/>
+          <a:p>
+            <a:r>
+              <a:rPr lang="en-US"/>
+              <a:t>2/7/20XX</a:t>
+            </a:r>
+            <a:endParaRPr lang="en-US" dirty="0"/>
+          </a:p>
+        </p:txBody>
+      </p:sp>
+      <p:sp>
+        <p:nvSpPr>
+          <p:cNvPr id="6" name="Slide Number Placeholder 5">
+            <a:extLst>
+              <a:ext uri="{FF2B5EF4-FFF2-40B4-BE49-F238E27FC236}">
+                <a16:creationId xmlns:a16="http://schemas.microsoft.com/office/drawing/2014/main" id="{48FD18D1-B5D5-C530-2676-33A2A238BEB0}"/>
+              </a:ext>
+            </a:extLst>
+          </p:cNvPr>
+          <p:cNvSpPr>
+            <a:spLocks noGrp="1"/>
+          </p:cNvSpPr>
+          <p:nvPr>
+            <p:ph type="sldNum" sz="quarter" idx="12"/>
+          </p:nvPr>
+        </p:nvSpPr>
+        <p:spPr/>
+        <p:txBody>
+          <a:bodyPr/>
+          <a:lstStyle/>
+          <a:p>
+            <a:fld id="{312CC964-A50B-4C29-B4E4-2C30BB34CCF3}" type="slidenum">
+              <a:rPr lang="en-US" smtClean="0"/>
+              <a:t>14</a:t>
+            </a:fld>
+            <a:endParaRPr lang="en-US" dirty="0"/>
+          </a:p>
+        </p:txBody>
+      </p:sp>
+      <p:graphicFrame>
+        <p:nvGraphicFramePr>
+          <p:cNvPr id="8" name="Table 8">
+            <a:extLst>
+              <a:ext uri="{FF2B5EF4-FFF2-40B4-BE49-F238E27FC236}">
+                <a16:creationId xmlns:a16="http://schemas.microsoft.com/office/drawing/2014/main" id="{9F347CCE-2B98-AAAA-A049-2DFDEBBC26EF}"/>
+              </a:ext>
+            </a:extLst>
+          </p:cNvPr>
+          <p:cNvGraphicFramePr>
+            <a:graphicFrameLocks noGrp="1"/>
+          </p:cNvGraphicFramePr>
+          <p:nvPr>
+            <p:extLst>
+              <p:ext uri="{D42A27DB-BD31-4B8C-83A1-F6EECF244321}">
+                <p14:modId xmlns:p14="http://schemas.microsoft.com/office/powerpoint/2010/main" val="252554399"/>
+              </p:ext>
+            </p:extLst>
+          </p:nvPr>
+        </p:nvGraphicFramePr>
+        <p:xfrm>
+          <a:off x="1919857" y="2871390"/>
+          <a:ext cx="8127999" cy="1854200"/>
+        </p:xfrm>
+        <a:graphic>
+          <a:graphicData uri="http://schemas.openxmlformats.org/drawingml/2006/table">
+            <a:tbl>
+              <a:tblPr firstRow="1" bandRow="1">
+                <a:tableStyleId>{5C22544A-7EE6-4342-B048-85BDC9FD1C3A}</a:tableStyleId>
+              </a:tblPr>
+              <a:tblGrid>
+                <a:gridCol w="2709333">
+                  <a:extLst>
+                    <a:ext uri="{9D8B030D-6E8A-4147-A177-3AD203B41FA5}">
+                      <a16:colId xmlns:a16="http://schemas.microsoft.com/office/drawing/2014/main" val="3690270857"/>
+                    </a:ext>
+                  </a:extLst>
+                </a:gridCol>
+                <a:gridCol w="2709333">
+                  <a:extLst>
+                    <a:ext uri="{9D8B030D-6E8A-4147-A177-3AD203B41FA5}">
+                      <a16:colId xmlns:a16="http://schemas.microsoft.com/office/drawing/2014/main" val="2690235070"/>
+                    </a:ext>
+                  </a:extLst>
+                </a:gridCol>
+                <a:gridCol w="2709333">
+                  <a:extLst>
+                    <a:ext uri="{9D8B030D-6E8A-4147-A177-3AD203B41FA5}">
+                      <a16:colId xmlns:a16="http://schemas.microsoft.com/office/drawing/2014/main" val="3976132914"/>
+                    </a:ext>
+                  </a:extLst>
+                </a:gridCol>
+              </a:tblGrid>
+              <a:tr h="370840">
+                <a:tc>
+                  <a:txBody>
+                    <a:bodyPr/>
+                    <a:lstStyle/>
+                    <a:p>
+                      <a:endParaRPr lang="en-AU"/>
+                    </a:p>
+                  </a:txBody>
+                  <a:tcPr/>
+                </a:tc>
+                <a:tc>
+                  <a:txBody>
+                    <a:bodyPr/>
+                    <a:lstStyle/>
+                    <a:p>
+                      <a:r>
+                        <a:rPr lang="en-AU" dirty="0"/>
+                        <a:t>Linear Regression</a:t>
+                      </a:r>
+                    </a:p>
+                  </a:txBody>
+                  <a:tcPr/>
+                </a:tc>
+                <a:tc>
+                  <a:txBody>
+                    <a:bodyPr/>
+                    <a:lstStyle/>
+                    <a:p>
+                      <a:r>
+                        <a:rPr lang="en-AU" dirty="0" err="1"/>
+                        <a:t>Keras</a:t>
+                      </a:r>
+                      <a:r>
+                        <a:rPr lang="en-AU" dirty="0"/>
+                        <a:t> Regression</a:t>
+                      </a:r>
+                    </a:p>
+                  </a:txBody>
+                  <a:tcPr/>
+                </a:tc>
+                <a:extLst>
+                  <a:ext uri="{0D108BD9-81ED-4DB2-BD59-A6C34878D82A}">
+                    <a16:rowId xmlns:a16="http://schemas.microsoft.com/office/drawing/2014/main" val="1508743397"/>
+                  </a:ext>
+                </a:extLst>
+              </a:tr>
+              <a:tr h="370840">
+                <a:tc>
+                  <a:txBody>
+                    <a:bodyPr/>
+                    <a:lstStyle/>
+                    <a:p>
+                      <a:r>
+                        <a:rPr lang="en-AU" dirty="0"/>
+                        <a:t>Mean Absolute Error</a:t>
+                      </a:r>
+                    </a:p>
+                  </a:txBody>
+                  <a:tcPr/>
+                </a:tc>
+                <a:tc>
+                  <a:txBody>
+                    <a:bodyPr/>
+                    <a:lstStyle/>
+                    <a:p>
+                      <a:pPr algn="r"/>
+                      <a:r>
+                        <a:rPr lang="en-AU" dirty="0"/>
+                        <a:t>132944.42</a:t>
+                      </a:r>
+                    </a:p>
+                  </a:txBody>
+                  <a:tcPr/>
+                </a:tc>
+                <a:tc>
+                  <a:txBody>
+                    <a:bodyPr/>
+                    <a:lstStyle/>
+                    <a:p>
+                      <a:pPr algn="r"/>
+                      <a:r>
+                        <a:rPr lang="en-AU" dirty="0"/>
+                        <a:t>105160.75</a:t>
+                      </a:r>
+                    </a:p>
+                  </a:txBody>
+                  <a:tcPr/>
+                </a:tc>
+                <a:extLst>
+                  <a:ext uri="{0D108BD9-81ED-4DB2-BD59-A6C34878D82A}">
+                    <a16:rowId xmlns:a16="http://schemas.microsoft.com/office/drawing/2014/main" val="1521582250"/>
+                  </a:ext>
+                </a:extLst>
+              </a:tr>
+              <a:tr h="370840">
+                <a:tc>
+                  <a:txBody>
+                    <a:bodyPr/>
+                    <a:lstStyle/>
+                    <a:p>
+                      <a:r>
+                        <a:rPr lang="en-AU" dirty="0"/>
+                        <a:t>Mean Squared Error</a:t>
+                      </a:r>
+                    </a:p>
+                  </a:txBody>
+                  <a:tcPr/>
+                </a:tc>
+                <a:tc>
+                  <a:txBody>
+                    <a:bodyPr/>
+                    <a:lstStyle/>
+                    <a:p>
+                      <a:pPr algn="r"/>
+                      <a:r>
+                        <a:rPr lang="en-AU" dirty="0"/>
+                        <a:t>37424819461.94</a:t>
+                      </a:r>
+                    </a:p>
+                  </a:txBody>
+                  <a:tcPr/>
+                </a:tc>
+                <a:tc>
+                  <a:txBody>
+                    <a:bodyPr/>
+                    <a:lstStyle/>
+                    <a:p>
+                      <a:pPr algn="r"/>
+                      <a:r>
+                        <a:rPr lang="en-AU" dirty="0"/>
+                        <a:t>26696349075.46</a:t>
+                      </a:r>
+                    </a:p>
+                  </a:txBody>
+                  <a:tcPr/>
+                </a:tc>
+                <a:extLst>
+                  <a:ext uri="{0D108BD9-81ED-4DB2-BD59-A6C34878D82A}">
+                    <a16:rowId xmlns:a16="http://schemas.microsoft.com/office/drawing/2014/main" val="1007024730"/>
+                  </a:ext>
+                </a:extLst>
+              </a:tr>
+              <a:tr h="370840">
+                <a:tc>
+                  <a:txBody>
+                    <a:bodyPr/>
+                    <a:lstStyle/>
+                    <a:p>
+                      <a:r>
+                        <a:rPr lang="en-AU" dirty="0"/>
+                        <a:t>Root Mean Squared Error</a:t>
+                      </a:r>
+                    </a:p>
+                  </a:txBody>
+                  <a:tcPr/>
+                </a:tc>
+                <a:tc>
+                  <a:txBody>
+                    <a:bodyPr/>
+                    <a:lstStyle/>
+                    <a:p>
+                      <a:pPr algn="r"/>
+                      <a:r>
+                        <a:rPr lang="en-AU" dirty="0"/>
+                        <a:t>193454.95</a:t>
+                      </a:r>
+                    </a:p>
+                  </a:txBody>
+                  <a:tcPr/>
+                </a:tc>
+                <a:tc>
+                  <a:txBody>
+                    <a:bodyPr/>
+                    <a:lstStyle/>
+                    <a:p>
+                      <a:pPr algn="r"/>
+                      <a:r>
+                        <a:rPr lang="en-AU" dirty="0"/>
+                        <a:t>163390.17</a:t>
+                      </a:r>
+                    </a:p>
+                  </a:txBody>
+                  <a:tcPr/>
+                </a:tc>
+                <a:extLst>
+                  <a:ext uri="{0D108BD9-81ED-4DB2-BD59-A6C34878D82A}">
+                    <a16:rowId xmlns:a16="http://schemas.microsoft.com/office/drawing/2014/main" val="578452780"/>
+                  </a:ext>
+                </a:extLst>
+              </a:tr>
+              <a:tr h="370840">
+                <a:tc>
+                  <a:txBody>
+                    <a:bodyPr/>
+                    <a:lstStyle/>
+                    <a:p>
+                      <a:r>
+                        <a:rPr lang="en-AU" dirty="0"/>
+                        <a:t>Variance Score</a:t>
+                      </a:r>
+                    </a:p>
+                  </a:txBody>
+                  <a:tcPr/>
+                </a:tc>
+                <a:tc>
+                  <a:txBody>
+                    <a:bodyPr/>
+                    <a:lstStyle/>
+                    <a:p>
+                      <a:pPr algn="r"/>
+                      <a:r>
+                        <a:rPr lang="en-AU" dirty="0"/>
+                        <a:t>57.52</a:t>
+                      </a:r>
+                    </a:p>
+                  </a:txBody>
+                  <a:tcPr/>
+                </a:tc>
+                <a:tc>
+                  <a:txBody>
+                    <a:bodyPr/>
+                    <a:lstStyle/>
+                    <a:p>
+                      <a:pPr algn="r"/>
+                      <a:r>
+                        <a:rPr lang="en-AU" dirty="0"/>
+                        <a:t>69.71</a:t>
+                      </a:r>
+                    </a:p>
+                  </a:txBody>
+                  <a:tcPr/>
+                </a:tc>
+                <a:extLst>
+                  <a:ext uri="{0D108BD9-81ED-4DB2-BD59-A6C34878D82A}">
+                    <a16:rowId xmlns:a16="http://schemas.microsoft.com/office/drawing/2014/main" val="2774849367"/>
+                  </a:ext>
+                </a:extLst>
+              </a:tr>
+            </a:tbl>
+          </a:graphicData>
+        </a:graphic>
+      </p:graphicFrame>
+    </p:spTree>
+    <p:extLst>
+      <p:ext uri="{BB962C8B-B14F-4D97-AF65-F5344CB8AC3E}">
+        <p14:creationId xmlns:p14="http://schemas.microsoft.com/office/powerpoint/2010/main" val="2904656340"/>
+      </p:ext>
+    </p:extLst>
+  </p:cSld>
+  <p:clrMapOvr>
+    <a:masterClrMapping/>
+  </p:clrMapOvr>
+</p:sld>
+</file>
+
+<file path=ppt/slides/slide15.xml><?xml version="1.0" encoding="utf-8"?>
+<p:sld xmlns:a="http://schemas.openxmlformats.org/drawingml/2006/main" xmlns:r="http://schemas.openxmlformats.org/officeDocument/2006/relationships" xmlns:p="http://schemas.openxmlformats.org/presentationml/2006/main">
+  <p:cSld>
+    <p:spTree>
+      <p:nvGrpSpPr>
+        <p:cNvPr id="1" name=""/>
+        <p:cNvGrpSpPr/>
+        <p:nvPr/>
+      </p:nvGrpSpPr>
+      <p:grpSpPr>
+        <a:xfrm>
+          <a:off x="0" y="0"/>
+          <a:ext cx="0" cy="0"/>
+          <a:chOff x="0" y="0"/>
+          <a:chExt cx="0" cy="0"/>
+        </a:xfrm>
+      </p:grpSpPr>
+      <p:sp>
+        <p:nvSpPr>
+          <p:cNvPr id="2" name="Title 1">
+            <a:extLst>
+              <a:ext uri="{FF2B5EF4-FFF2-40B4-BE49-F238E27FC236}">
+                <a16:creationId xmlns:a16="http://schemas.microsoft.com/office/drawing/2014/main" id="{8169516C-0AF6-1171-C2E2-2AD3700E90A5}"/>
+              </a:ext>
+            </a:extLst>
+          </p:cNvPr>
+          <p:cNvSpPr>
+            <a:spLocks noGrp="1"/>
+          </p:cNvSpPr>
+          <p:nvPr>
+            <p:ph type="title"/>
+          </p:nvPr>
+        </p:nvSpPr>
+        <p:spPr/>
+        <p:txBody>
+          <a:bodyPr/>
+          <a:lstStyle/>
+          <a:p>
+            <a:r>
+              <a:rPr lang="en-AU" dirty="0"/>
+              <a:t>Regression line of the </a:t>
+            </a:r>
+            <a:r>
+              <a:rPr lang="en-AU" dirty="0" err="1"/>
+              <a:t>keras</a:t>
+            </a:r>
+            <a:r>
+              <a:rPr lang="en-AU" dirty="0"/>
+              <a:t> model</a:t>
+            </a:r>
+          </a:p>
+        </p:txBody>
+      </p:sp>
+      <p:pic>
+        <p:nvPicPr>
+          <p:cNvPr id="8" name="Content Placeholder 7">
+            <a:extLst>
+              <a:ext uri="{FF2B5EF4-FFF2-40B4-BE49-F238E27FC236}">
+                <a16:creationId xmlns:a16="http://schemas.microsoft.com/office/drawing/2014/main" id="{4788A709-6C0D-7463-535A-F18F968C0F11}"/>
+              </a:ext>
+            </a:extLst>
+          </p:cNvPr>
+          <p:cNvPicPr>
+            <a:picLocks noGrp="1" noChangeAspect="1"/>
+          </p:cNvPicPr>
+          <p:nvPr>
+            <p:ph idx="1"/>
+          </p:nvPr>
+        </p:nvPicPr>
+        <p:blipFill rotWithShape="1">
+          <a:blip r:embed="rId2"/>
+          <a:srcRect r="982" b="1749"/>
+          <a:stretch/>
+        </p:blipFill>
+        <p:spPr>
+          <a:xfrm>
+            <a:off x="2403086" y="1915557"/>
+            <a:ext cx="6976934" cy="3821525"/>
+          </a:xfrm>
+        </p:spPr>
+      </p:pic>
+      <p:sp>
+        <p:nvSpPr>
+          <p:cNvPr id="4" name="Footer Placeholder 3">
+            <a:extLst>
+              <a:ext uri="{FF2B5EF4-FFF2-40B4-BE49-F238E27FC236}">
+                <a16:creationId xmlns:a16="http://schemas.microsoft.com/office/drawing/2014/main" id="{06682E04-A750-6B1A-C886-495B3F283736}"/>
+              </a:ext>
+            </a:extLst>
+          </p:cNvPr>
+          <p:cNvSpPr>
+            <a:spLocks noGrp="1"/>
+          </p:cNvSpPr>
+          <p:nvPr>
+            <p:ph type="ftr" sz="quarter" idx="11"/>
+          </p:nvPr>
+        </p:nvSpPr>
+        <p:spPr/>
+        <p:txBody>
+          <a:bodyPr/>
+          <a:lstStyle/>
+          <a:p>
+            <a:r>
+              <a:rPr lang="en-US"/>
+              <a:t>Sample Footer Text</a:t>
+            </a:r>
+            <a:endParaRPr lang="en-US" dirty="0"/>
+          </a:p>
+        </p:txBody>
+      </p:sp>
+      <p:sp>
+        <p:nvSpPr>
+          <p:cNvPr id="5" name="Date Placeholder 4">
+            <a:extLst>
+              <a:ext uri="{FF2B5EF4-FFF2-40B4-BE49-F238E27FC236}">
+                <a16:creationId xmlns:a16="http://schemas.microsoft.com/office/drawing/2014/main" id="{D54838F1-DC30-74B2-31CD-E697DBAE289C}"/>
+              </a:ext>
+            </a:extLst>
+          </p:cNvPr>
+          <p:cNvSpPr>
+            <a:spLocks noGrp="1"/>
+          </p:cNvSpPr>
+          <p:nvPr>
+            <p:ph type="dt" sz="half" idx="10"/>
+          </p:nvPr>
+        </p:nvSpPr>
+        <p:spPr/>
+        <p:txBody>
+          <a:bodyPr/>
+          <a:lstStyle/>
+          <a:p>
+            <a:r>
+              <a:rPr lang="en-US"/>
+              <a:t>2/7/20XX</a:t>
+            </a:r>
+            <a:endParaRPr lang="en-US" dirty="0"/>
+          </a:p>
+        </p:txBody>
+      </p:sp>
+      <p:sp>
+        <p:nvSpPr>
+          <p:cNvPr id="6" name="Slide Number Placeholder 5">
+            <a:extLst>
+              <a:ext uri="{FF2B5EF4-FFF2-40B4-BE49-F238E27FC236}">
+                <a16:creationId xmlns:a16="http://schemas.microsoft.com/office/drawing/2014/main" id="{93DC3B74-07E4-3153-4651-7808D41D8525}"/>
+              </a:ext>
+            </a:extLst>
+          </p:cNvPr>
+          <p:cNvSpPr>
+            <a:spLocks noGrp="1"/>
+          </p:cNvSpPr>
+          <p:nvPr>
+            <p:ph type="sldNum" sz="quarter" idx="12"/>
+          </p:nvPr>
+        </p:nvSpPr>
+        <p:spPr/>
+        <p:txBody>
+          <a:bodyPr/>
+          <a:lstStyle/>
+          <a:p>
+            <a:fld id="{312CC964-A50B-4C29-B4E4-2C30BB34CCF3}" type="slidenum">
+              <a:rPr lang="en-US" smtClean="0"/>
+              <a:t>15</a:t>
+            </a:fld>
+            <a:endParaRPr lang="en-US" dirty="0"/>
+          </a:p>
+        </p:txBody>
+      </p:sp>
+    </p:spTree>
+    <p:extLst>
+      <p:ext uri="{BB962C8B-B14F-4D97-AF65-F5344CB8AC3E}">
+        <p14:creationId xmlns:p14="http://schemas.microsoft.com/office/powerpoint/2010/main" val="1207464153"/>
+      </p:ext>
+    </p:extLst>
+  </p:cSld>
+  <p:clrMapOvr>
+    <a:masterClrMapping/>
+  </p:clrMapOvr>
+</p:sld>
+</file>
+
+<file path=ppt/slides/slide16.xml><?xml version="1.0" encoding="utf-8"?>
+<p:sld xmlns:a="http://schemas.openxmlformats.org/drawingml/2006/main" xmlns:r="http://schemas.openxmlformats.org/officeDocument/2006/relationships" xmlns:p="http://schemas.openxmlformats.org/presentationml/2006/main">
+  <p:cSld>
+    <p:spTree>
+      <p:nvGrpSpPr>
+        <p:cNvPr id="1" name=""/>
+        <p:cNvGrpSpPr/>
+        <p:nvPr/>
+      </p:nvGrpSpPr>
+      <p:grpSpPr>
+        <a:xfrm>
+          <a:off x="0" y="0"/>
+          <a:ext cx="0" cy="0"/>
+          <a:chOff x="0" y="0"/>
+          <a:chExt cx="0" cy="0"/>
+        </a:xfrm>
+      </p:grpSpPr>
+      <p:sp>
+        <p:nvSpPr>
+          <p:cNvPr id="2" name="Title 1">
+            <a:extLst>
+              <a:ext uri="{FF2B5EF4-FFF2-40B4-BE49-F238E27FC236}">
+                <a16:creationId xmlns:a16="http://schemas.microsoft.com/office/drawing/2014/main" id="{F177F827-FC34-F934-9E23-65DFBAD119F9}"/>
+              </a:ext>
+            </a:extLst>
+          </p:cNvPr>
+          <p:cNvSpPr>
+            <a:spLocks noGrp="1"/>
+          </p:cNvSpPr>
+          <p:nvPr>
+            <p:ph type="title"/>
+          </p:nvPr>
+        </p:nvSpPr>
+        <p:spPr/>
+        <p:txBody>
+          <a:bodyPr/>
+          <a:lstStyle/>
+          <a:p>
+            <a:pPr algn="ctr"/>
+            <a:r>
+              <a:rPr lang="en-AU" dirty="0"/>
+              <a:t>Comparison of actual data vs predicted data</a:t>
+            </a:r>
+          </a:p>
+        </p:txBody>
+      </p:sp>
+      <p:sp>
+        <p:nvSpPr>
+          <p:cNvPr id="5" name="Date Placeholder 4">
+            <a:extLst>
+              <a:ext uri="{FF2B5EF4-FFF2-40B4-BE49-F238E27FC236}">
+                <a16:creationId xmlns:a16="http://schemas.microsoft.com/office/drawing/2014/main" id="{D4CC44BB-8CA2-6F26-C8ED-CC33B0252769}"/>
+              </a:ext>
+            </a:extLst>
+          </p:cNvPr>
+          <p:cNvSpPr>
+            <a:spLocks noGrp="1"/>
+          </p:cNvSpPr>
+          <p:nvPr>
+            <p:ph type="dt" sz="half" idx="10"/>
+          </p:nvPr>
+        </p:nvSpPr>
+        <p:spPr/>
+        <p:txBody>
+          <a:bodyPr/>
+          <a:lstStyle/>
+          <a:p>
+            <a:r>
+              <a:rPr lang="en-US"/>
+              <a:t>2/7/20XX</a:t>
+            </a:r>
+            <a:endParaRPr lang="en-US" dirty="0"/>
+          </a:p>
+        </p:txBody>
+      </p:sp>
+      <p:sp>
+        <p:nvSpPr>
+          <p:cNvPr id="6" name="Slide Number Placeholder 5">
+            <a:extLst>
+              <a:ext uri="{FF2B5EF4-FFF2-40B4-BE49-F238E27FC236}">
+                <a16:creationId xmlns:a16="http://schemas.microsoft.com/office/drawing/2014/main" id="{2FA9EB30-525D-6F09-233E-A803FB440FB0}"/>
+              </a:ext>
+            </a:extLst>
+          </p:cNvPr>
+          <p:cNvSpPr>
+            <a:spLocks noGrp="1"/>
+          </p:cNvSpPr>
+          <p:nvPr>
+            <p:ph type="sldNum" sz="quarter" idx="12"/>
+          </p:nvPr>
+        </p:nvSpPr>
+        <p:spPr/>
+        <p:txBody>
+          <a:bodyPr/>
+          <a:lstStyle/>
+          <a:p>
+            <a:fld id="{312CC964-A50B-4C29-B4E4-2C30BB34CCF3}" type="slidenum">
+              <a:rPr lang="en-US" smtClean="0"/>
+              <a:t>16</a:t>
+            </a:fld>
+            <a:endParaRPr lang="en-US" dirty="0"/>
+          </a:p>
+        </p:txBody>
+      </p:sp>
+      <p:graphicFrame>
+        <p:nvGraphicFramePr>
+          <p:cNvPr id="15" name="Table 15">
+            <a:extLst>
+              <a:ext uri="{FF2B5EF4-FFF2-40B4-BE49-F238E27FC236}">
+                <a16:creationId xmlns:a16="http://schemas.microsoft.com/office/drawing/2014/main" id="{49A95812-D96F-44CB-8EAD-8859EAD1E252}"/>
+              </a:ext>
+            </a:extLst>
+          </p:cNvPr>
+          <p:cNvGraphicFramePr>
+            <a:graphicFrameLocks noGrp="1"/>
+          </p:cNvGraphicFramePr>
+          <p:nvPr>
+            <p:extLst>
+              <p:ext uri="{D42A27DB-BD31-4B8C-83A1-F6EECF244321}">
+                <p14:modId xmlns:p14="http://schemas.microsoft.com/office/powerpoint/2010/main" val="2423439447"/>
+              </p:ext>
+            </p:extLst>
+          </p:nvPr>
+        </p:nvGraphicFramePr>
+        <p:xfrm>
+          <a:off x="1868870" y="2222100"/>
+          <a:ext cx="3263847" cy="4023360"/>
+        </p:xfrm>
+        <a:graphic>
+          <a:graphicData uri="http://schemas.openxmlformats.org/drawingml/2006/table">
+            <a:tbl>
+              <a:tblPr firstRow="1" bandRow="1">
+                <a:tableStyleId>{5C22544A-7EE6-4342-B048-85BDC9FD1C3A}</a:tableStyleId>
+              </a:tblPr>
+              <a:tblGrid>
+                <a:gridCol w="1087949">
+                  <a:extLst>
+                    <a:ext uri="{9D8B030D-6E8A-4147-A177-3AD203B41FA5}">
+                      <a16:colId xmlns:a16="http://schemas.microsoft.com/office/drawing/2014/main" val="1403720951"/>
+                    </a:ext>
+                  </a:extLst>
+                </a:gridCol>
+                <a:gridCol w="1087949">
+                  <a:extLst>
+                    <a:ext uri="{9D8B030D-6E8A-4147-A177-3AD203B41FA5}">
+                      <a16:colId xmlns:a16="http://schemas.microsoft.com/office/drawing/2014/main" val="873319655"/>
+                    </a:ext>
+                  </a:extLst>
+                </a:gridCol>
+                <a:gridCol w="1087949">
+                  <a:extLst>
+                    <a:ext uri="{9D8B030D-6E8A-4147-A177-3AD203B41FA5}">
+                      <a16:colId xmlns:a16="http://schemas.microsoft.com/office/drawing/2014/main" val="4270006897"/>
+                    </a:ext>
+                  </a:extLst>
+                </a:gridCol>
+              </a:tblGrid>
+              <a:tr h="324000">
+                <a:tc>
+                  <a:txBody>
+                    <a:bodyPr/>
+                    <a:lstStyle/>
+                    <a:p>
+                      <a:endParaRPr lang="en-AU" dirty="0"/>
+                    </a:p>
+                  </a:txBody>
+                  <a:tcPr/>
+                </a:tc>
+                <a:tc>
+                  <a:txBody>
+                    <a:bodyPr/>
+                    <a:lstStyle/>
+                    <a:p>
+                      <a:r>
+                        <a:rPr lang="en-AU" dirty="0"/>
+                        <a:t>Actual</a:t>
+                      </a:r>
+                    </a:p>
+                  </a:txBody>
+                  <a:tcPr/>
+                </a:tc>
+                <a:tc>
+                  <a:txBody>
+                    <a:bodyPr/>
+                    <a:lstStyle/>
+                    <a:p>
+                      <a:r>
+                        <a:rPr lang="en-AU" dirty="0"/>
+                        <a:t>Predicted</a:t>
+                      </a:r>
+                    </a:p>
+                  </a:txBody>
+                  <a:tcPr/>
+                </a:tc>
+                <a:extLst>
+                  <a:ext uri="{0D108BD9-81ED-4DB2-BD59-A6C34878D82A}">
+                    <a16:rowId xmlns:a16="http://schemas.microsoft.com/office/drawing/2014/main" val="16918165"/>
+                  </a:ext>
+                </a:extLst>
+              </a:tr>
+              <a:tr h="324000">
+                <a:tc>
+                  <a:txBody>
+                    <a:bodyPr/>
+                    <a:lstStyle/>
+                    <a:p>
+                      <a:r>
+                        <a:rPr lang="en-AU" dirty="0"/>
+                        <a:t>1</a:t>
+                      </a:r>
+                    </a:p>
+                  </a:txBody>
+                  <a:tcPr/>
+                </a:tc>
+                <a:tc>
+                  <a:txBody>
+                    <a:bodyPr/>
+                    <a:lstStyle/>
+                    <a:p>
+                      <a:pPr algn="r"/>
+                      <a:r>
+                        <a:rPr lang="en-AU" dirty="0"/>
+                        <a:t>500000</a:t>
+                      </a:r>
+                    </a:p>
+                  </a:txBody>
+                  <a:tcPr/>
+                </a:tc>
+                <a:tc>
+                  <a:txBody>
+                    <a:bodyPr/>
+                    <a:lstStyle/>
+                    <a:p>
+                      <a:pPr algn="r"/>
+                      <a:r>
+                        <a:rPr lang="en-AU" dirty="0"/>
+                        <a:t>556277</a:t>
+                      </a:r>
+                    </a:p>
+                  </a:txBody>
+                  <a:tcPr/>
+                </a:tc>
+                <a:extLst>
+                  <a:ext uri="{0D108BD9-81ED-4DB2-BD59-A6C34878D82A}">
+                    <a16:rowId xmlns:a16="http://schemas.microsoft.com/office/drawing/2014/main" val="1719547698"/>
+                  </a:ext>
+                </a:extLst>
+              </a:tr>
+              <a:tr h="324000">
+                <a:tc>
+                  <a:txBody>
+                    <a:bodyPr/>
+                    <a:lstStyle/>
+                    <a:p>
+                      <a:r>
+                        <a:rPr lang="en-AU" dirty="0"/>
+                        <a:t>2</a:t>
+                      </a:r>
+                    </a:p>
+                  </a:txBody>
+                  <a:tcPr/>
+                </a:tc>
+                <a:tc>
+                  <a:txBody>
+                    <a:bodyPr/>
+                    <a:lstStyle/>
+                    <a:p>
+                      <a:pPr algn="r"/>
+                      <a:r>
+                        <a:rPr lang="en-AU" dirty="0"/>
+                        <a:t>415000</a:t>
+                      </a:r>
+                    </a:p>
+                  </a:txBody>
+                  <a:tcPr/>
+                </a:tc>
+                <a:tc>
+                  <a:txBody>
+                    <a:bodyPr/>
+                    <a:lstStyle/>
+                    <a:p>
+                      <a:pPr algn="r"/>
+                      <a:r>
+                        <a:rPr lang="en-AU" dirty="0"/>
+                        <a:t>555837</a:t>
+                      </a:r>
+                    </a:p>
+                  </a:txBody>
+                  <a:tcPr/>
+                </a:tc>
+                <a:extLst>
+                  <a:ext uri="{0D108BD9-81ED-4DB2-BD59-A6C34878D82A}">
+                    <a16:rowId xmlns:a16="http://schemas.microsoft.com/office/drawing/2014/main" val="3163216001"/>
+                  </a:ext>
+                </a:extLst>
+              </a:tr>
+              <a:tr h="324000">
+                <a:tc>
+                  <a:txBody>
+                    <a:bodyPr/>
+                    <a:lstStyle/>
+                    <a:p>
+                      <a:r>
+                        <a:rPr lang="en-AU" dirty="0"/>
+                        <a:t>3</a:t>
+                      </a:r>
+                    </a:p>
+                  </a:txBody>
+                  <a:tcPr/>
+                </a:tc>
+                <a:tc>
+                  <a:txBody>
+                    <a:bodyPr/>
+                    <a:lstStyle/>
+                    <a:p>
+                      <a:pPr algn="r"/>
+                      <a:r>
+                        <a:rPr lang="en-AU" dirty="0"/>
+                        <a:t>1700000</a:t>
+                      </a:r>
+                    </a:p>
+                  </a:txBody>
+                  <a:tcPr/>
+                </a:tc>
+                <a:tc>
+                  <a:txBody>
+                    <a:bodyPr/>
+                    <a:lstStyle/>
+                    <a:p>
+                      <a:pPr algn="r"/>
+                      <a:r>
+                        <a:rPr lang="en-AU" dirty="0"/>
+                        <a:t>1031199</a:t>
+                      </a:r>
+                    </a:p>
+                  </a:txBody>
+                  <a:tcPr/>
+                </a:tc>
+                <a:extLst>
+                  <a:ext uri="{0D108BD9-81ED-4DB2-BD59-A6C34878D82A}">
+                    <a16:rowId xmlns:a16="http://schemas.microsoft.com/office/drawing/2014/main" val="3676427008"/>
+                  </a:ext>
+                </a:extLst>
+              </a:tr>
+              <a:tr h="324000">
+                <a:tc>
+                  <a:txBody>
+                    <a:bodyPr/>
+                    <a:lstStyle/>
+                    <a:p>
+                      <a:r>
+                        <a:rPr lang="en-AU" dirty="0"/>
+                        <a:t>4</a:t>
+                      </a:r>
+                    </a:p>
+                  </a:txBody>
+                  <a:tcPr/>
+                </a:tc>
+                <a:tc>
+                  <a:txBody>
+                    <a:bodyPr/>
+                    <a:lstStyle/>
+                    <a:p>
+                      <a:pPr algn="r"/>
+                      <a:r>
+                        <a:rPr lang="en-AU" dirty="0"/>
+                        <a:t>680000</a:t>
+                      </a:r>
+                    </a:p>
+                  </a:txBody>
+                  <a:tcPr/>
+                </a:tc>
+                <a:tc>
+                  <a:txBody>
+                    <a:bodyPr/>
+                    <a:lstStyle/>
+                    <a:p>
+                      <a:pPr algn="r"/>
+                      <a:r>
+                        <a:rPr lang="en-AU" dirty="0"/>
+                        <a:t>831717</a:t>
+                      </a:r>
+                    </a:p>
+                  </a:txBody>
+                  <a:tcPr/>
+                </a:tc>
+                <a:extLst>
+                  <a:ext uri="{0D108BD9-81ED-4DB2-BD59-A6C34878D82A}">
+                    <a16:rowId xmlns:a16="http://schemas.microsoft.com/office/drawing/2014/main" val="733714916"/>
+                  </a:ext>
+                </a:extLst>
+              </a:tr>
+              <a:tr h="324000">
+                <a:tc>
+                  <a:txBody>
+                    <a:bodyPr/>
+                    <a:lstStyle/>
+                    <a:p>
+                      <a:r>
+                        <a:rPr lang="en-AU" dirty="0"/>
+                        <a:t>5</a:t>
+                      </a:r>
+                    </a:p>
+                  </a:txBody>
+                  <a:tcPr/>
+                </a:tc>
+                <a:tc>
+                  <a:txBody>
+                    <a:bodyPr/>
+                    <a:lstStyle/>
+                    <a:p>
+                      <a:pPr algn="r"/>
+                      <a:r>
+                        <a:rPr lang="en-AU" dirty="0"/>
+                        <a:t>355000</a:t>
+                      </a:r>
+                    </a:p>
+                  </a:txBody>
+                  <a:tcPr/>
+                </a:tc>
+                <a:tc>
+                  <a:txBody>
+                    <a:bodyPr/>
+                    <a:lstStyle/>
+                    <a:p>
+                      <a:pPr algn="r"/>
+                      <a:r>
+                        <a:rPr lang="en-AU" dirty="0"/>
+                        <a:t>385473</a:t>
+                      </a:r>
+                    </a:p>
+                  </a:txBody>
+                  <a:tcPr/>
+                </a:tc>
+                <a:extLst>
+                  <a:ext uri="{0D108BD9-81ED-4DB2-BD59-A6C34878D82A}">
+                    <a16:rowId xmlns:a16="http://schemas.microsoft.com/office/drawing/2014/main" val="3855829390"/>
+                  </a:ext>
+                </a:extLst>
+              </a:tr>
+              <a:tr h="324000">
+                <a:tc>
+                  <a:txBody>
+                    <a:bodyPr/>
+                    <a:lstStyle/>
+                    <a:p>
+                      <a:r>
+                        <a:rPr lang="en-AU" dirty="0"/>
+                        <a:t>6</a:t>
+                      </a:r>
+                    </a:p>
+                  </a:txBody>
+                  <a:tcPr/>
+                </a:tc>
+                <a:tc>
+                  <a:txBody>
+                    <a:bodyPr/>
+                    <a:lstStyle/>
+                    <a:p>
+                      <a:pPr algn="r"/>
+                      <a:r>
+                        <a:rPr lang="en-AU" dirty="0"/>
+                        <a:t>400000</a:t>
+                      </a:r>
+                    </a:p>
+                  </a:txBody>
+                  <a:tcPr/>
+                </a:tc>
+                <a:tc>
+                  <a:txBody>
+                    <a:bodyPr/>
+                    <a:lstStyle/>
+                    <a:p>
+                      <a:pPr algn="r"/>
+                      <a:r>
+                        <a:rPr lang="en-AU" dirty="0"/>
+                        <a:t>395733</a:t>
+                      </a:r>
+                    </a:p>
+                  </a:txBody>
+                  <a:tcPr/>
+                </a:tc>
+                <a:extLst>
+                  <a:ext uri="{0D108BD9-81ED-4DB2-BD59-A6C34878D82A}">
+                    <a16:rowId xmlns:a16="http://schemas.microsoft.com/office/drawing/2014/main" val="867744002"/>
+                  </a:ext>
+                </a:extLst>
+              </a:tr>
+              <a:tr h="324000">
+                <a:tc>
+                  <a:txBody>
+                    <a:bodyPr/>
+                    <a:lstStyle/>
+                    <a:p>
+                      <a:r>
+                        <a:rPr lang="en-AU" dirty="0"/>
+                        <a:t>7</a:t>
+                      </a:r>
+                    </a:p>
+                  </a:txBody>
+                  <a:tcPr/>
+                </a:tc>
+                <a:tc>
+                  <a:txBody>
+                    <a:bodyPr/>
+                    <a:lstStyle/>
+                    <a:p>
+                      <a:pPr algn="r"/>
+                      <a:r>
+                        <a:rPr lang="en-AU" dirty="0"/>
+                        <a:t>460000</a:t>
+                      </a:r>
+                    </a:p>
+                  </a:txBody>
+                  <a:tcPr/>
+                </a:tc>
+                <a:tc>
+                  <a:txBody>
+                    <a:bodyPr/>
+                    <a:lstStyle/>
+                    <a:p>
+                      <a:pPr algn="r"/>
+                      <a:r>
+                        <a:rPr lang="en-AU" dirty="0"/>
+                        <a:t>520468</a:t>
+                      </a:r>
+                    </a:p>
+                  </a:txBody>
+                  <a:tcPr/>
+                </a:tc>
+                <a:extLst>
+                  <a:ext uri="{0D108BD9-81ED-4DB2-BD59-A6C34878D82A}">
+                    <a16:rowId xmlns:a16="http://schemas.microsoft.com/office/drawing/2014/main" val="1097730234"/>
+                  </a:ext>
+                </a:extLst>
+              </a:tr>
+              <a:tr h="324000">
+                <a:tc>
+                  <a:txBody>
+                    <a:bodyPr/>
+                    <a:lstStyle/>
+                    <a:p>
+                      <a:r>
+                        <a:rPr lang="en-AU" dirty="0"/>
+                        <a:t>8</a:t>
+                      </a:r>
+                    </a:p>
+                  </a:txBody>
+                  <a:tcPr/>
+                </a:tc>
+                <a:tc>
+                  <a:txBody>
+                    <a:bodyPr/>
+                    <a:lstStyle/>
+                    <a:p>
+                      <a:pPr algn="r"/>
+                      <a:r>
+                        <a:rPr lang="en-AU" dirty="0"/>
+                        <a:t>330000</a:t>
+                      </a:r>
+                    </a:p>
+                  </a:txBody>
+                  <a:tcPr/>
+                </a:tc>
+                <a:tc>
+                  <a:txBody>
+                    <a:bodyPr/>
+                    <a:lstStyle/>
+                    <a:p>
+                      <a:pPr algn="r"/>
+                      <a:r>
+                        <a:rPr lang="en-AU" dirty="0"/>
+                        <a:t>392015</a:t>
+                      </a:r>
+                    </a:p>
+                  </a:txBody>
+                  <a:tcPr/>
+                </a:tc>
+                <a:extLst>
+                  <a:ext uri="{0D108BD9-81ED-4DB2-BD59-A6C34878D82A}">
+                    <a16:rowId xmlns:a16="http://schemas.microsoft.com/office/drawing/2014/main" val="924617211"/>
+                  </a:ext>
+                </a:extLst>
+              </a:tr>
+              <a:tr h="324000">
+                <a:tc>
+                  <a:txBody>
+                    <a:bodyPr/>
+                    <a:lstStyle/>
+                    <a:p>
+                      <a:r>
+                        <a:rPr lang="en-AU" dirty="0"/>
+                        <a:t>9</a:t>
+                      </a:r>
+                    </a:p>
+                  </a:txBody>
+                  <a:tcPr/>
+                </a:tc>
+                <a:tc>
+                  <a:txBody>
+                    <a:bodyPr/>
+                    <a:lstStyle/>
+                    <a:p>
+                      <a:pPr algn="r"/>
+                      <a:r>
+                        <a:rPr lang="en-AU" dirty="0"/>
+                        <a:t>609000</a:t>
+                      </a:r>
+                    </a:p>
+                  </a:txBody>
+                  <a:tcPr/>
+                </a:tc>
+                <a:tc>
+                  <a:txBody>
+                    <a:bodyPr/>
+                    <a:lstStyle/>
+                    <a:p>
+                      <a:pPr algn="r"/>
+                      <a:r>
+                        <a:rPr lang="en-AU" dirty="0"/>
+                        <a:t>770292</a:t>
+                      </a:r>
+                    </a:p>
+                  </a:txBody>
+                  <a:tcPr/>
+                </a:tc>
+                <a:extLst>
+                  <a:ext uri="{0D108BD9-81ED-4DB2-BD59-A6C34878D82A}">
+                    <a16:rowId xmlns:a16="http://schemas.microsoft.com/office/drawing/2014/main" val="1526944222"/>
+                  </a:ext>
+                </a:extLst>
+              </a:tr>
+              <a:tr h="324000">
+                <a:tc>
+                  <a:txBody>
+                    <a:bodyPr/>
+                    <a:lstStyle/>
+                    <a:p>
+                      <a:r>
+                        <a:rPr lang="en-AU" dirty="0"/>
+                        <a:t>10</a:t>
+                      </a:r>
+                    </a:p>
+                  </a:txBody>
+                  <a:tcPr/>
+                </a:tc>
+                <a:tc>
+                  <a:txBody>
+                    <a:bodyPr/>
+                    <a:lstStyle/>
+                    <a:p>
+                      <a:pPr algn="r"/>
+                      <a:r>
+                        <a:rPr lang="en-AU" dirty="0"/>
+                        <a:t>530000</a:t>
+                      </a:r>
+                    </a:p>
+                  </a:txBody>
+                  <a:tcPr/>
+                </a:tc>
+                <a:tc>
+                  <a:txBody>
+                    <a:bodyPr/>
+                    <a:lstStyle/>
+                    <a:p>
+                      <a:pPr algn="r"/>
+                      <a:r>
+                        <a:rPr lang="en-AU" dirty="0"/>
+                        <a:t>483061</a:t>
+                      </a:r>
+                    </a:p>
+                  </a:txBody>
+                  <a:tcPr/>
+                </a:tc>
+                <a:extLst>
+                  <a:ext uri="{0D108BD9-81ED-4DB2-BD59-A6C34878D82A}">
+                    <a16:rowId xmlns:a16="http://schemas.microsoft.com/office/drawing/2014/main" val="3778634970"/>
+                  </a:ext>
+                </a:extLst>
+              </a:tr>
+            </a:tbl>
+          </a:graphicData>
+        </a:graphic>
+      </p:graphicFrame>
+      <p:graphicFrame>
+        <p:nvGraphicFramePr>
+          <p:cNvPr id="16" name="Table 15">
+            <a:extLst>
+              <a:ext uri="{FF2B5EF4-FFF2-40B4-BE49-F238E27FC236}">
+                <a16:creationId xmlns:a16="http://schemas.microsoft.com/office/drawing/2014/main" id="{B47B95B3-CC38-F165-2AC0-DE03EA9E2020}"/>
+              </a:ext>
+            </a:extLst>
+          </p:cNvPr>
+          <p:cNvGraphicFramePr>
+            <a:graphicFrameLocks noGrp="1"/>
+          </p:cNvGraphicFramePr>
+          <p:nvPr>
+            <p:extLst>
+              <p:ext uri="{D42A27DB-BD31-4B8C-83A1-F6EECF244321}">
+                <p14:modId xmlns:p14="http://schemas.microsoft.com/office/powerpoint/2010/main" val="568012809"/>
+              </p:ext>
+            </p:extLst>
+          </p:nvPr>
+        </p:nvGraphicFramePr>
+        <p:xfrm>
+          <a:off x="6960933" y="2222100"/>
+          <a:ext cx="3263847" cy="4023360"/>
+        </p:xfrm>
+        <a:graphic>
+          <a:graphicData uri="http://schemas.openxmlformats.org/drawingml/2006/table">
+            <a:tbl>
+              <a:tblPr firstRow="1" bandRow="1">
+                <a:tableStyleId>{5C22544A-7EE6-4342-B048-85BDC9FD1C3A}</a:tableStyleId>
+              </a:tblPr>
+              <a:tblGrid>
+                <a:gridCol w="1087949">
+                  <a:extLst>
+                    <a:ext uri="{9D8B030D-6E8A-4147-A177-3AD203B41FA5}">
+                      <a16:colId xmlns:a16="http://schemas.microsoft.com/office/drawing/2014/main" val="1403720951"/>
+                    </a:ext>
+                  </a:extLst>
+                </a:gridCol>
+                <a:gridCol w="1087949">
+                  <a:extLst>
+                    <a:ext uri="{9D8B030D-6E8A-4147-A177-3AD203B41FA5}">
+                      <a16:colId xmlns:a16="http://schemas.microsoft.com/office/drawing/2014/main" val="873319655"/>
+                    </a:ext>
+                  </a:extLst>
+                </a:gridCol>
+                <a:gridCol w="1087949">
+                  <a:extLst>
+                    <a:ext uri="{9D8B030D-6E8A-4147-A177-3AD203B41FA5}">
+                      <a16:colId xmlns:a16="http://schemas.microsoft.com/office/drawing/2014/main" val="4270006897"/>
+                    </a:ext>
+                  </a:extLst>
+                </a:gridCol>
+              </a:tblGrid>
+              <a:tr h="324000">
+                <a:tc>
+                  <a:txBody>
+                    <a:bodyPr/>
+                    <a:lstStyle/>
+                    <a:p>
+                      <a:endParaRPr lang="en-AU" dirty="0"/>
+                    </a:p>
+                  </a:txBody>
+                  <a:tcPr/>
+                </a:tc>
+                <a:tc>
+                  <a:txBody>
+                    <a:bodyPr/>
+                    <a:lstStyle/>
+                    <a:p>
+                      <a:r>
+                        <a:rPr lang="en-AU" dirty="0"/>
+                        <a:t>Actual</a:t>
+                      </a:r>
+                    </a:p>
+                  </a:txBody>
+                  <a:tcPr/>
+                </a:tc>
+                <a:tc>
+                  <a:txBody>
+                    <a:bodyPr/>
+                    <a:lstStyle/>
+                    <a:p>
+                      <a:r>
+                        <a:rPr lang="en-AU" dirty="0"/>
+                        <a:t>Predicted</a:t>
+                      </a:r>
+                    </a:p>
+                  </a:txBody>
+                  <a:tcPr/>
+                </a:tc>
+                <a:extLst>
+                  <a:ext uri="{0D108BD9-81ED-4DB2-BD59-A6C34878D82A}">
+                    <a16:rowId xmlns:a16="http://schemas.microsoft.com/office/drawing/2014/main" val="16918165"/>
+                  </a:ext>
+                </a:extLst>
+              </a:tr>
+              <a:tr h="324000">
+                <a:tc>
+                  <a:txBody>
+                    <a:bodyPr/>
+                    <a:lstStyle/>
+                    <a:p>
+                      <a:r>
+                        <a:rPr lang="en-AU" dirty="0"/>
+                        <a:t>1</a:t>
+                      </a:r>
+                    </a:p>
+                  </a:txBody>
+                  <a:tcPr/>
+                </a:tc>
+                <a:tc>
+                  <a:txBody>
+                    <a:bodyPr/>
+                    <a:lstStyle/>
+                    <a:p>
+                      <a:pPr algn="r"/>
+                      <a:r>
+                        <a:rPr lang="en-AU" dirty="0"/>
+                        <a:t>500000</a:t>
+                      </a:r>
+                    </a:p>
+                  </a:txBody>
+                  <a:tcPr/>
+                </a:tc>
+                <a:tc>
+                  <a:txBody>
+                    <a:bodyPr/>
+                    <a:lstStyle/>
+                    <a:p>
+                      <a:pPr algn="r"/>
+                      <a:r>
+                        <a:rPr lang="en-AU" dirty="0"/>
+                        <a:t>502713</a:t>
+                      </a:r>
+                    </a:p>
+                  </a:txBody>
+                  <a:tcPr/>
+                </a:tc>
+                <a:extLst>
+                  <a:ext uri="{0D108BD9-81ED-4DB2-BD59-A6C34878D82A}">
+                    <a16:rowId xmlns:a16="http://schemas.microsoft.com/office/drawing/2014/main" val="1719547698"/>
+                  </a:ext>
+                </a:extLst>
+              </a:tr>
+              <a:tr h="324000">
+                <a:tc>
+                  <a:txBody>
+                    <a:bodyPr/>
+                    <a:lstStyle/>
+                    <a:p>
+                      <a:r>
+                        <a:rPr lang="en-AU" dirty="0"/>
+                        <a:t>2</a:t>
+                      </a:r>
+                    </a:p>
+                  </a:txBody>
+                  <a:tcPr/>
+                </a:tc>
+                <a:tc>
+                  <a:txBody>
+                    <a:bodyPr/>
+                    <a:lstStyle/>
+                    <a:p>
+                      <a:pPr algn="r"/>
+                      <a:r>
+                        <a:rPr lang="en-AU" dirty="0"/>
+                        <a:t>415000</a:t>
+                      </a:r>
+                    </a:p>
+                  </a:txBody>
+                  <a:tcPr/>
+                </a:tc>
+                <a:tc>
+                  <a:txBody>
+                    <a:bodyPr/>
+                    <a:lstStyle/>
+                    <a:p>
+                      <a:pPr algn="r"/>
+                      <a:r>
+                        <a:rPr lang="en-AU" dirty="0"/>
+                        <a:t>499446</a:t>
+                      </a:r>
+                    </a:p>
+                  </a:txBody>
+                  <a:tcPr/>
+                </a:tc>
+                <a:extLst>
+                  <a:ext uri="{0D108BD9-81ED-4DB2-BD59-A6C34878D82A}">
+                    <a16:rowId xmlns:a16="http://schemas.microsoft.com/office/drawing/2014/main" val="3163216001"/>
+                  </a:ext>
+                </a:extLst>
+              </a:tr>
+              <a:tr h="324000">
+                <a:tc>
+                  <a:txBody>
+                    <a:bodyPr/>
+                    <a:lstStyle/>
+                    <a:p>
+                      <a:r>
+                        <a:rPr lang="en-AU" dirty="0"/>
+                        <a:t>3</a:t>
+                      </a:r>
+                    </a:p>
+                  </a:txBody>
+                  <a:tcPr/>
+                </a:tc>
+                <a:tc>
+                  <a:txBody>
+                    <a:bodyPr/>
+                    <a:lstStyle/>
+                    <a:p>
+                      <a:pPr algn="r"/>
+                      <a:r>
+                        <a:rPr lang="en-AU" dirty="0"/>
+                        <a:t>1700000</a:t>
+                      </a:r>
+                    </a:p>
+                  </a:txBody>
+                  <a:tcPr/>
+                </a:tc>
+                <a:tc>
+                  <a:txBody>
+                    <a:bodyPr/>
+                    <a:lstStyle/>
+                    <a:p>
+                      <a:pPr algn="r"/>
+                      <a:r>
+                        <a:rPr lang="en-AU" dirty="0"/>
+                        <a:t>1285180</a:t>
+                      </a:r>
+                    </a:p>
+                  </a:txBody>
+                  <a:tcPr/>
+                </a:tc>
+                <a:extLst>
+                  <a:ext uri="{0D108BD9-81ED-4DB2-BD59-A6C34878D82A}">
+                    <a16:rowId xmlns:a16="http://schemas.microsoft.com/office/drawing/2014/main" val="3676427008"/>
+                  </a:ext>
+                </a:extLst>
+              </a:tr>
+              <a:tr h="324000">
+                <a:tc>
+                  <a:txBody>
+                    <a:bodyPr/>
+                    <a:lstStyle/>
+                    <a:p>
+                      <a:r>
+                        <a:rPr lang="en-AU" dirty="0"/>
+                        <a:t>4</a:t>
+                      </a:r>
+                    </a:p>
+                  </a:txBody>
+                  <a:tcPr/>
+                </a:tc>
+                <a:tc>
+                  <a:txBody>
+                    <a:bodyPr/>
+                    <a:lstStyle/>
+                    <a:p>
+                      <a:pPr algn="r"/>
+                      <a:r>
+                        <a:rPr lang="en-AU" dirty="0"/>
+                        <a:t>680000</a:t>
+                      </a:r>
+                    </a:p>
+                  </a:txBody>
+                  <a:tcPr/>
+                </a:tc>
+                <a:tc>
+                  <a:txBody>
+                    <a:bodyPr/>
+                    <a:lstStyle/>
+                    <a:p>
+                      <a:pPr algn="r"/>
+                      <a:r>
+                        <a:rPr lang="en-AU" dirty="0"/>
+                        <a:t>731213</a:t>
+                      </a:r>
+                    </a:p>
+                  </a:txBody>
+                  <a:tcPr/>
+                </a:tc>
+                <a:extLst>
+                  <a:ext uri="{0D108BD9-81ED-4DB2-BD59-A6C34878D82A}">
+                    <a16:rowId xmlns:a16="http://schemas.microsoft.com/office/drawing/2014/main" val="733714916"/>
+                  </a:ext>
+                </a:extLst>
+              </a:tr>
+              <a:tr h="324000">
+                <a:tc>
+                  <a:txBody>
+                    <a:bodyPr/>
+                    <a:lstStyle/>
+                    <a:p>
+                      <a:r>
+                        <a:rPr lang="en-AU" dirty="0"/>
+                        <a:t>5</a:t>
+                      </a:r>
+                    </a:p>
+                  </a:txBody>
+                  <a:tcPr/>
+                </a:tc>
+                <a:tc>
+                  <a:txBody>
+                    <a:bodyPr/>
+                    <a:lstStyle/>
+                    <a:p>
+                      <a:pPr algn="r"/>
+                      <a:r>
+                        <a:rPr lang="en-AU" dirty="0"/>
+                        <a:t>355000</a:t>
+                      </a:r>
+                    </a:p>
+                  </a:txBody>
+                  <a:tcPr/>
+                </a:tc>
+                <a:tc>
+                  <a:txBody>
+                    <a:bodyPr/>
+                    <a:lstStyle/>
+                    <a:p>
+                      <a:pPr algn="r"/>
+                      <a:r>
+                        <a:rPr lang="en-AU" dirty="0"/>
+                        <a:t>379196</a:t>
+                      </a:r>
+                    </a:p>
+                  </a:txBody>
+                  <a:tcPr/>
+                </a:tc>
+                <a:extLst>
+                  <a:ext uri="{0D108BD9-81ED-4DB2-BD59-A6C34878D82A}">
+                    <a16:rowId xmlns:a16="http://schemas.microsoft.com/office/drawing/2014/main" val="3855829390"/>
+                  </a:ext>
+                </a:extLst>
+              </a:tr>
+              <a:tr h="324000">
+                <a:tc>
+                  <a:txBody>
+                    <a:bodyPr/>
+                    <a:lstStyle/>
+                    <a:p>
+                      <a:r>
+                        <a:rPr lang="en-AU" dirty="0"/>
+                        <a:t>6</a:t>
+                      </a:r>
+                    </a:p>
+                  </a:txBody>
+                  <a:tcPr/>
+                </a:tc>
+                <a:tc>
+                  <a:txBody>
+                    <a:bodyPr/>
+                    <a:lstStyle/>
+                    <a:p>
+                      <a:pPr algn="r"/>
+                      <a:r>
+                        <a:rPr lang="en-AU" dirty="0"/>
+                        <a:t>400000</a:t>
+                      </a:r>
+                    </a:p>
+                  </a:txBody>
+                  <a:tcPr/>
+                </a:tc>
+                <a:tc>
+                  <a:txBody>
+                    <a:bodyPr/>
+                    <a:lstStyle/>
+                    <a:p>
+                      <a:pPr algn="r"/>
+                      <a:r>
+                        <a:rPr lang="en-AU" dirty="0"/>
+                        <a:t>361695</a:t>
+                      </a:r>
+                    </a:p>
+                  </a:txBody>
+                  <a:tcPr/>
+                </a:tc>
+                <a:extLst>
+                  <a:ext uri="{0D108BD9-81ED-4DB2-BD59-A6C34878D82A}">
+                    <a16:rowId xmlns:a16="http://schemas.microsoft.com/office/drawing/2014/main" val="867744002"/>
+                  </a:ext>
+                </a:extLst>
+              </a:tr>
+              <a:tr h="324000">
+                <a:tc>
+                  <a:txBody>
+                    <a:bodyPr/>
+                    <a:lstStyle/>
+                    <a:p>
+                      <a:r>
+                        <a:rPr lang="en-AU" dirty="0"/>
+                        <a:t>7</a:t>
+                      </a:r>
+                    </a:p>
+                  </a:txBody>
+                  <a:tcPr/>
+                </a:tc>
+                <a:tc>
+                  <a:txBody>
+                    <a:bodyPr/>
+                    <a:lstStyle/>
+                    <a:p>
+                      <a:pPr algn="r"/>
+                      <a:r>
+                        <a:rPr lang="en-AU" dirty="0"/>
+                        <a:t>460000</a:t>
+                      </a:r>
+                    </a:p>
+                  </a:txBody>
+                  <a:tcPr/>
+                </a:tc>
+                <a:tc>
+                  <a:txBody>
+                    <a:bodyPr/>
+                    <a:lstStyle/>
+                    <a:p>
+                      <a:pPr algn="r"/>
+                      <a:r>
+                        <a:rPr lang="en-AU" dirty="0"/>
+                        <a:t>417202</a:t>
+                      </a:r>
+                    </a:p>
+                  </a:txBody>
+                  <a:tcPr/>
+                </a:tc>
+                <a:extLst>
+                  <a:ext uri="{0D108BD9-81ED-4DB2-BD59-A6C34878D82A}">
+                    <a16:rowId xmlns:a16="http://schemas.microsoft.com/office/drawing/2014/main" val="1097730234"/>
+                  </a:ext>
+                </a:extLst>
+              </a:tr>
+              <a:tr h="324000">
+                <a:tc>
+                  <a:txBody>
+                    <a:bodyPr/>
+                    <a:lstStyle/>
+                    <a:p>
+                      <a:r>
+                        <a:rPr lang="en-AU" dirty="0"/>
+                        <a:t>8</a:t>
+                      </a:r>
+                    </a:p>
+                  </a:txBody>
+                  <a:tcPr/>
+                </a:tc>
+                <a:tc>
+                  <a:txBody>
+                    <a:bodyPr/>
+                    <a:lstStyle/>
+                    <a:p>
+                      <a:pPr algn="r"/>
+                      <a:r>
+                        <a:rPr lang="en-AU" dirty="0"/>
+                        <a:t>330000</a:t>
+                      </a:r>
+                    </a:p>
+                  </a:txBody>
+                  <a:tcPr/>
+                </a:tc>
+                <a:tc>
+                  <a:txBody>
+                    <a:bodyPr/>
+                    <a:lstStyle/>
+                    <a:p>
+                      <a:pPr algn="r"/>
+                      <a:r>
+                        <a:rPr lang="en-AU" dirty="0"/>
+                        <a:t>497613</a:t>
+                      </a:r>
+                    </a:p>
+                  </a:txBody>
+                  <a:tcPr/>
+                </a:tc>
+                <a:extLst>
+                  <a:ext uri="{0D108BD9-81ED-4DB2-BD59-A6C34878D82A}">
+                    <a16:rowId xmlns:a16="http://schemas.microsoft.com/office/drawing/2014/main" val="924617211"/>
+                  </a:ext>
+                </a:extLst>
+              </a:tr>
+              <a:tr h="324000">
+                <a:tc>
+                  <a:txBody>
+                    <a:bodyPr/>
+                    <a:lstStyle/>
+                    <a:p>
+                      <a:r>
+                        <a:rPr lang="en-AU" dirty="0"/>
+                        <a:t>9</a:t>
+                      </a:r>
+                    </a:p>
+                  </a:txBody>
+                  <a:tcPr/>
+                </a:tc>
+                <a:tc>
+                  <a:txBody>
+                    <a:bodyPr/>
+                    <a:lstStyle/>
+                    <a:p>
+                      <a:pPr algn="r"/>
+                      <a:r>
+                        <a:rPr lang="en-AU" dirty="0"/>
+                        <a:t>609000</a:t>
+                      </a:r>
+                    </a:p>
+                  </a:txBody>
+                  <a:tcPr/>
+                </a:tc>
+                <a:tc>
+                  <a:txBody>
+                    <a:bodyPr/>
+                    <a:lstStyle/>
+                    <a:p>
+                      <a:pPr algn="r"/>
+                      <a:r>
+                        <a:rPr lang="en-AU" dirty="0"/>
+                        <a:t>711002</a:t>
+                      </a:r>
+                    </a:p>
+                  </a:txBody>
+                  <a:tcPr/>
+                </a:tc>
+                <a:extLst>
+                  <a:ext uri="{0D108BD9-81ED-4DB2-BD59-A6C34878D82A}">
+                    <a16:rowId xmlns:a16="http://schemas.microsoft.com/office/drawing/2014/main" val="1526944222"/>
+                  </a:ext>
+                </a:extLst>
+              </a:tr>
+              <a:tr h="324000">
+                <a:tc>
+                  <a:txBody>
+                    <a:bodyPr/>
+                    <a:lstStyle/>
+                    <a:p>
+                      <a:r>
+                        <a:rPr lang="en-AU" dirty="0"/>
+                        <a:t>10</a:t>
+                      </a:r>
+                    </a:p>
+                  </a:txBody>
+                  <a:tcPr/>
+                </a:tc>
+                <a:tc>
+                  <a:txBody>
+                    <a:bodyPr/>
+                    <a:lstStyle/>
+                    <a:p>
+                      <a:pPr algn="r"/>
+                      <a:r>
+                        <a:rPr lang="en-AU" dirty="0"/>
+                        <a:t>530000</a:t>
+                      </a:r>
+                    </a:p>
+                  </a:txBody>
+                  <a:tcPr/>
+                </a:tc>
+                <a:tc>
+                  <a:txBody>
+                    <a:bodyPr/>
+                    <a:lstStyle/>
+                    <a:p>
+                      <a:pPr algn="r"/>
+                      <a:r>
+                        <a:rPr lang="en-AU" dirty="0"/>
+                        <a:t>533381</a:t>
+                      </a:r>
+                    </a:p>
+                  </a:txBody>
+                  <a:tcPr/>
+                </a:tc>
+                <a:extLst>
+                  <a:ext uri="{0D108BD9-81ED-4DB2-BD59-A6C34878D82A}">
+                    <a16:rowId xmlns:a16="http://schemas.microsoft.com/office/drawing/2014/main" val="3778634970"/>
+                  </a:ext>
+                </a:extLst>
+              </a:tr>
+            </a:tbl>
+          </a:graphicData>
+        </a:graphic>
+      </p:graphicFrame>
+      <p:sp>
+        <p:nvSpPr>
+          <p:cNvPr id="19" name="TextBox 18">
+            <a:extLst>
+              <a:ext uri="{FF2B5EF4-FFF2-40B4-BE49-F238E27FC236}">
+                <a16:creationId xmlns:a16="http://schemas.microsoft.com/office/drawing/2014/main" id="{4EACAFFC-180B-EA75-EF93-D3FB7EE7D643}"/>
+              </a:ext>
+            </a:extLst>
+          </p:cNvPr>
+          <p:cNvSpPr txBox="1"/>
+          <p:nvPr/>
+        </p:nvSpPr>
+        <p:spPr>
+          <a:xfrm>
+            <a:off x="2664666" y="1826919"/>
+            <a:ext cx="1672253" cy="369332"/>
+          </a:xfrm>
+          <a:prstGeom prst="rect">
+            <a:avLst/>
+          </a:prstGeom>
+          <a:noFill/>
+        </p:spPr>
+        <p:txBody>
+          <a:bodyPr wrap="none" rtlCol="0">
+            <a:spAutoFit/>
+          </a:bodyPr>
+          <a:lstStyle/>
+          <a:p>
+            <a:r>
+              <a:rPr lang="en-AU" dirty="0"/>
+              <a:t>Linear Regression</a:t>
+            </a:r>
+          </a:p>
+        </p:txBody>
+      </p:sp>
+      <p:sp>
+        <p:nvSpPr>
+          <p:cNvPr id="20" name="TextBox 19">
+            <a:extLst>
+              <a:ext uri="{FF2B5EF4-FFF2-40B4-BE49-F238E27FC236}">
+                <a16:creationId xmlns:a16="http://schemas.microsoft.com/office/drawing/2014/main" id="{C2C5922B-F7C3-3383-D386-1563428B5FB8}"/>
+              </a:ext>
+            </a:extLst>
+          </p:cNvPr>
+          <p:cNvSpPr txBox="1"/>
+          <p:nvPr/>
+        </p:nvSpPr>
+        <p:spPr>
+          <a:xfrm>
+            <a:off x="7775965" y="1810129"/>
+            <a:ext cx="1633781" cy="369332"/>
+          </a:xfrm>
+          <a:prstGeom prst="rect">
+            <a:avLst/>
+          </a:prstGeom>
+          <a:noFill/>
+        </p:spPr>
+        <p:txBody>
+          <a:bodyPr wrap="none" rtlCol="0">
+            <a:spAutoFit/>
+          </a:bodyPr>
+          <a:lstStyle/>
+          <a:p>
+            <a:r>
+              <a:rPr lang="en-AU" dirty="0" err="1"/>
+              <a:t>Keras</a:t>
+            </a:r>
+            <a:r>
+              <a:rPr lang="en-AU" dirty="0"/>
+              <a:t> Regression</a:t>
+            </a:r>
+          </a:p>
+        </p:txBody>
+      </p:sp>
+    </p:spTree>
+    <p:extLst>
+      <p:ext uri="{BB962C8B-B14F-4D97-AF65-F5344CB8AC3E}">
+        <p14:creationId xmlns:p14="http://schemas.microsoft.com/office/powerpoint/2010/main" val="3599883670"/>
       </p:ext>
     </p:extLst>
   </p:cSld>
@@ -15729,6 +18149,34 @@
 </file>
 
 <file path=customXml/item1.xml><?xml version="1.0" encoding="utf-8"?>
+<?mso-contentType ?>
+<FormTemplates xmlns="http://schemas.microsoft.com/sharepoint/v3/contenttype/forms">
+  <Display>DocumentLibraryForm</Display>
+  <Edit>DocumentLibraryForm</Edit>
+  <New>DocumentLibraryForm</New>
+</FormTemplates>
+</file>
+
+<file path=customXml/item2.xml><?xml version="1.0" encoding="utf-8"?>
+<p:properties xmlns:p="http://schemas.microsoft.com/office/2006/metadata/properties" xmlns:xsi="http://www.w3.org/2001/XMLSchema-instance" xmlns:pc="http://schemas.microsoft.com/office/infopath/2007/PartnerControls">
+  <documentManagement>
+    <Status xmlns="71af3243-3dd4-4a8d-8c0d-dd76da1f02a5">Not started</Status>
+    <_ip_UnifiedCompliancePolicyUIAction xmlns="http://schemas.microsoft.com/sharepoint/v3" xsi:nil="true"/>
+    <Image xmlns="71af3243-3dd4-4a8d-8c0d-dd76da1f02a5">
+      <Url xsi:nil="true"/>
+      <Description xsi:nil="true"/>
+    </Image>
+    <_ip_UnifiedCompliancePolicyProperties xmlns="http://schemas.microsoft.com/sharepoint/v3" xsi:nil="true"/>
+    <lcf76f155ced4ddcb4097134ff3c332f xmlns="71af3243-3dd4-4a8d-8c0d-dd76da1f02a5">
+      <Terms xmlns="http://schemas.microsoft.com/office/infopath/2007/PartnerControls"/>
+    </lcf76f155ced4ddcb4097134ff3c332f>
+    <TaxCatchAll xmlns="230e9df3-be65-4c73-a93b-d1236ebd677e"/>
+    <MediaServiceKeyPoints xmlns="71af3243-3dd4-4a8d-8c0d-dd76da1f02a5" xsi:nil="true"/>
+  </documentManagement>
+</p:properties>
+</file>
+
+<file path=customXml/item3.xml><?xml version="1.0" encoding="utf-8"?>
 <ct:contentTypeSchema xmlns:ct="http://schemas.microsoft.com/office/2006/metadata/contentType" xmlns:ma="http://schemas.microsoft.com/office/2006/metadata/properties/metaAttributes" ct:_="" ma:_="" ma:contentTypeName="Document" ma:contentTypeID="0x01010079F111ED35F8CC479449609E8A0923A6" ma:contentTypeVersion="18" ma:contentTypeDescription="Create a new document." ma:contentTypeScope="" ma:versionID="22a266b9fa9a230c5a512669d8b298c3">
   <xsd:schema xmlns:xsd="http://www.w3.org/2001/XMLSchema" xmlns:xs="http://www.w3.org/2001/XMLSchema" xmlns:p="http://schemas.microsoft.com/office/2006/metadata/properties" xmlns:ns1="http://schemas.microsoft.com/sharepoint/v3" xmlns:ns2="71af3243-3dd4-4a8d-8c0d-dd76da1f02a5" xmlns:ns3="16c05727-aa75-4e4a-9b5f-8a80a1165891" xmlns:ns4="230e9df3-be65-4c73-a93b-d1236ebd677e" targetNamespace="http://schemas.microsoft.com/office/2006/metadata/properties" ma:root="true" ma:fieldsID="eddc33fff6b14141ee5c74a0d29ea6a1" ns1:_="" ns2:_="" ns3:_="" ns4:_="">
     <xsd:import namespace="http://schemas.microsoft.com/sharepoint/v3"/>
@@ -16004,35 +18452,27 @@
 </ct:contentTypeSchema>
 </file>
 
-<file path=customXml/item2.xml><?xml version="1.0" encoding="utf-8"?>
-<p:properties xmlns:p="http://schemas.microsoft.com/office/2006/metadata/properties" xmlns:xsi="http://www.w3.org/2001/XMLSchema-instance" xmlns:pc="http://schemas.microsoft.com/office/infopath/2007/PartnerControls">
-  <documentManagement>
-    <Status xmlns="71af3243-3dd4-4a8d-8c0d-dd76da1f02a5">Not started</Status>
-    <_ip_UnifiedCompliancePolicyUIAction xmlns="http://schemas.microsoft.com/sharepoint/v3" xsi:nil="true"/>
-    <Image xmlns="71af3243-3dd4-4a8d-8c0d-dd76da1f02a5">
-      <Url xsi:nil="true"/>
-      <Description xsi:nil="true"/>
-    </Image>
-    <_ip_UnifiedCompliancePolicyProperties xmlns="http://schemas.microsoft.com/sharepoint/v3" xsi:nil="true"/>
-    <lcf76f155ced4ddcb4097134ff3c332f xmlns="71af3243-3dd4-4a8d-8c0d-dd76da1f02a5">
-      <Terms xmlns="http://schemas.microsoft.com/office/infopath/2007/PartnerControls"/>
-    </lcf76f155ced4ddcb4097134ff3c332f>
-    <TaxCatchAll xmlns="230e9df3-be65-4c73-a93b-d1236ebd677e"/>
-    <MediaServiceKeyPoints xmlns="71af3243-3dd4-4a8d-8c0d-dd76da1f02a5" xsi:nil="true"/>
-  </documentManagement>
-</p:properties>
+<file path=customXml/itemProps1.xml><?xml version="1.0" encoding="utf-8"?>
+<ds:datastoreItem xmlns:ds="http://schemas.openxmlformats.org/officeDocument/2006/customXml" ds:itemID="{207C1F5B-A1D0-429A-8E7C-3E271353D1E0}">
+  <ds:schemaRefs>
+    <ds:schemaRef ds:uri="http://schemas.microsoft.com/sharepoint/v3/contenttype/forms"/>
+  </ds:schemaRefs>
+</ds:datastoreItem>
 </file>
 
-<file path=customXml/item3.xml><?xml version="1.0" encoding="utf-8"?>
-<?mso-contentType ?>
-<FormTemplates xmlns="http://schemas.microsoft.com/sharepoint/v3/contenttype/forms">
-  <Display>DocumentLibraryForm</Display>
-  <Edit>DocumentLibraryForm</Edit>
-  <New>DocumentLibraryForm</New>
-</FormTemplates>
+<file path=customXml/itemProps2.xml><?xml version="1.0" encoding="utf-8"?>
+<ds:datastoreItem xmlns:ds="http://schemas.openxmlformats.org/officeDocument/2006/customXml" ds:itemID="{B15CABE4-909F-4611-A0E1-6E45080B3C9E}">
+  <ds:schemaRefs>
+    <ds:schemaRef ds:uri="http://schemas.microsoft.com/office/2006/metadata/properties"/>
+    <ds:schemaRef ds:uri="http://schemas.microsoft.com/office/infopath/2007/PartnerControls"/>
+    <ds:schemaRef ds:uri="71af3243-3dd4-4a8d-8c0d-dd76da1f02a5"/>
+    <ds:schemaRef ds:uri="http://schemas.microsoft.com/sharepoint/v3"/>
+    <ds:schemaRef ds:uri="230e9df3-be65-4c73-a93b-d1236ebd677e"/>
+  </ds:schemaRefs>
+</ds:datastoreItem>
 </file>
 
-<file path=customXml/itemProps1.xml><?xml version="1.0" encoding="utf-8"?>
+<file path=customXml/itemProps3.xml><?xml version="1.0" encoding="utf-8"?>
 <ds:datastoreItem xmlns:ds="http://schemas.openxmlformats.org/officeDocument/2006/customXml" ds:itemID="{AA1E8BDE-7A03-4563-82F6-53B214F89568}">
   <ds:schemaRefs>
     <ds:schemaRef ds:uri="http://schemas.microsoft.com/office/2006/metadata/contentType"/>
@@ -16053,26 +18493,6 @@
 </ds:datastoreItem>
 </file>
 
-<file path=customXml/itemProps2.xml><?xml version="1.0" encoding="utf-8"?>
-<ds:datastoreItem xmlns:ds="http://schemas.openxmlformats.org/officeDocument/2006/customXml" ds:itemID="{B15CABE4-909F-4611-A0E1-6E45080B3C9E}">
-  <ds:schemaRefs>
-    <ds:schemaRef ds:uri="http://schemas.microsoft.com/office/2006/metadata/properties"/>
-    <ds:schemaRef ds:uri="http://schemas.microsoft.com/office/infopath/2007/PartnerControls"/>
-    <ds:schemaRef ds:uri="71af3243-3dd4-4a8d-8c0d-dd76da1f02a5"/>
-    <ds:schemaRef ds:uri="http://schemas.microsoft.com/sharepoint/v3"/>
-    <ds:schemaRef ds:uri="230e9df3-be65-4c73-a93b-d1236ebd677e"/>
-  </ds:schemaRefs>
-</ds:datastoreItem>
-</file>
-
-<file path=customXml/itemProps3.xml><?xml version="1.0" encoding="utf-8"?>
-<ds:datastoreItem xmlns:ds="http://schemas.openxmlformats.org/officeDocument/2006/customXml" ds:itemID="{207C1F5B-A1D0-429A-8E7C-3E271353D1E0}">
-  <ds:schemaRefs>
-    <ds:schemaRef ds:uri="http://schemas.microsoft.com/sharepoint/v3/contenttype/forms"/>
-  </ds:schemaRefs>
-</ds:datastoreItem>
-</file>
-
 <file path=docMetadata/LabelInfo.xml><?xml version="1.0" encoding="utf-8"?>
 <clbl:labelList xmlns:clbl="http://schemas.microsoft.com/office/2020/mipLabelMetadata">
   <clbl:label id="{f42aa342-8706-4288-bd11-ebb85995028c}" enabled="1" method="Standard" siteId="{72f988bf-86f1-41af-91ab-2d7cd011db47}" contentBits="0" removed="0"/>

</xml_diff>